<commit_message>
Adapting the presentation for the WeAreWearables event.
</commit_message>
<xml_diff>
--- a/WAWT_Presentation/MyoMusicWeAreWearables.pptx
+++ b/WAWT_Presentation/MyoMusicWeAreWearables.pptx
@@ -1,26 +1,121 @@
 
 <file path=ppt/presentation.xml><?xml version="1.0" encoding="utf-8"?>
-<p:presentation xmlns:a="http://schemas.openxmlformats.org/drawingml/2006/main" xmlns:p="http://schemas.openxmlformats.org/presentationml/2006/main" xmlns:r="http://schemas.openxmlformats.org/officeDocument/2006/relationships">
+<p:presentation xmlns:a="http://schemas.openxmlformats.org/drawingml/2006/main" xmlns:r="http://schemas.openxmlformats.org/officeDocument/2006/relationships" xmlns:p="http://schemas.openxmlformats.org/presentationml/2006/main">
   <p:sldMasterIdLst>
-    <p:sldMasterId id="2147483648" r:id="rId2"/>
-    <p:sldMasterId id="2147483661" r:id="rId3"/>
+    <p:sldMasterId id="2147483648" r:id="rId1"/>
+    <p:sldMasterId id="2147483661" r:id="rId2"/>
   </p:sldMasterIdLst>
   <p:sldIdLst>
-    <p:sldId id="256" r:id="rId4"/>
-    <p:sldId id="257" r:id="rId5"/>
-    <p:sldId id="258" r:id="rId6"/>
-    <p:sldId id="259" r:id="rId7"/>
-    <p:sldId id="260" r:id="rId8"/>
-    <p:sldId id="261" r:id="rId9"/>
-    <p:sldId id="262" r:id="rId10"/>
+    <p:sldId id="256" r:id="rId3"/>
+    <p:sldId id="257" r:id="rId4"/>
+    <p:sldId id="263" r:id="rId5"/>
+    <p:sldId id="259" r:id="rId6"/>
+    <p:sldId id="260" r:id="rId7"/>
+    <p:sldId id="261" r:id="rId8"/>
+    <p:sldId id="264" r:id="rId9"/>
   </p:sldIdLst>
-  <p:sldSz cx="9144000" cy="6858000"/>
+  <p:sldSz cx="9144000" cy="6858000" type="screen4x3"/>
   <p:notesSz cx="7772400" cy="10058400"/>
+  <p:defaultTextStyle>
+    <a:defPPr>
+      <a:defRPr lang="en-US"/>
+    </a:defPPr>
+    <a:lvl1pPr marL="0" algn="l" defTabSz="457200" rtl="0" eaLnBrk="1" latinLnBrk="0" hangingPunct="1">
+      <a:defRPr sz="1800" kern="1200">
+        <a:solidFill>
+          <a:schemeClr val="tx1"/>
+        </a:solidFill>
+        <a:latin typeface="+mn-lt"/>
+        <a:ea typeface="+mn-ea"/>
+        <a:cs typeface="+mn-cs"/>
+      </a:defRPr>
+    </a:lvl1pPr>
+    <a:lvl2pPr marL="457200" algn="l" defTabSz="457200" rtl="0" eaLnBrk="1" latinLnBrk="0" hangingPunct="1">
+      <a:defRPr sz="1800" kern="1200">
+        <a:solidFill>
+          <a:schemeClr val="tx1"/>
+        </a:solidFill>
+        <a:latin typeface="+mn-lt"/>
+        <a:ea typeface="+mn-ea"/>
+        <a:cs typeface="+mn-cs"/>
+      </a:defRPr>
+    </a:lvl2pPr>
+    <a:lvl3pPr marL="914400" algn="l" defTabSz="457200" rtl="0" eaLnBrk="1" latinLnBrk="0" hangingPunct="1">
+      <a:defRPr sz="1800" kern="1200">
+        <a:solidFill>
+          <a:schemeClr val="tx1"/>
+        </a:solidFill>
+        <a:latin typeface="+mn-lt"/>
+        <a:ea typeface="+mn-ea"/>
+        <a:cs typeface="+mn-cs"/>
+      </a:defRPr>
+    </a:lvl3pPr>
+    <a:lvl4pPr marL="1371600" algn="l" defTabSz="457200" rtl="0" eaLnBrk="1" latinLnBrk="0" hangingPunct="1">
+      <a:defRPr sz="1800" kern="1200">
+        <a:solidFill>
+          <a:schemeClr val="tx1"/>
+        </a:solidFill>
+        <a:latin typeface="+mn-lt"/>
+        <a:ea typeface="+mn-ea"/>
+        <a:cs typeface="+mn-cs"/>
+      </a:defRPr>
+    </a:lvl4pPr>
+    <a:lvl5pPr marL="1828800" algn="l" defTabSz="457200" rtl="0" eaLnBrk="1" latinLnBrk="0" hangingPunct="1">
+      <a:defRPr sz="1800" kern="1200">
+        <a:solidFill>
+          <a:schemeClr val="tx1"/>
+        </a:solidFill>
+        <a:latin typeface="+mn-lt"/>
+        <a:ea typeface="+mn-ea"/>
+        <a:cs typeface="+mn-cs"/>
+      </a:defRPr>
+    </a:lvl5pPr>
+    <a:lvl6pPr marL="2286000" algn="l" defTabSz="457200" rtl="0" eaLnBrk="1" latinLnBrk="0" hangingPunct="1">
+      <a:defRPr sz="1800" kern="1200">
+        <a:solidFill>
+          <a:schemeClr val="tx1"/>
+        </a:solidFill>
+        <a:latin typeface="+mn-lt"/>
+        <a:ea typeface="+mn-ea"/>
+        <a:cs typeface="+mn-cs"/>
+      </a:defRPr>
+    </a:lvl6pPr>
+    <a:lvl7pPr marL="2743200" algn="l" defTabSz="457200" rtl="0" eaLnBrk="1" latinLnBrk="0" hangingPunct="1">
+      <a:defRPr sz="1800" kern="1200">
+        <a:solidFill>
+          <a:schemeClr val="tx1"/>
+        </a:solidFill>
+        <a:latin typeface="+mn-lt"/>
+        <a:ea typeface="+mn-ea"/>
+        <a:cs typeface="+mn-cs"/>
+      </a:defRPr>
+    </a:lvl7pPr>
+    <a:lvl8pPr marL="3200400" algn="l" defTabSz="457200" rtl="0" eaLnBrk="1" latinLnBrk="0" hangingPunct="1">
+      <a:defRPr sz="1800" kern="1200">
+        <a:solidFill>
+          <a:schemeClr val="tx1"/>
+        </a:solidFill>
+        <a:latin typeface="+mn-lt"/>
+        <a:ea typeface="+mn-ea"/>
+        <a:cs typeface="+mn-cs"/>
+      </a:defRPr>
+    </a:lvl8pPr>
+    <a:lvl9pPr marL="3657600" algn="l" defTabSz="457200" rtl="0" eaLnBrk="1" latinLnBrk="0" hangingPunct="1">
+      <a:defRPr sz="1800" kern="1200">
+        <a:solidFill>
+          <a:schemeClr val="tx1"/>
+        </a:solidFill>
+        <a:latin typeface="+mn-lt"/>
+        <a:ea typeface="+mn-ea"/>
+        <a:cs typeface="+mn-cs"/>
+      </a:defRPr>
+    </a:lvl9pPr>
+  </p:defaultTextStyle>
 </p:presentation>
 </file>
 
 <file path=ppt/slideLayouts/slideLayout1.xml><?xml version="1.0" encoding="utf-8"?>
-<p:sldLayout xmlns:a="http://schemas.openxmlformats.org/drawingml/2006/main" xmlns:p="http://schemas.openxmlformats.org/presentationml/2006/main" xmlns:r="http://schemas.openxmlformats.org/officeDocument/2006/relationships" preserve="1" type="blank">
+<p:sldLayout xmlns:a="http://schemas.openxmlformats.org/drawingml/2006/main" xmlns:r="http://schemas.openxmlformats.org/officeDocument/2006/relationships" xmlns:p="http://schemas.openxmlformats.org/presentationml/2006/main" type="blank" preserve="1">
   <p:cSld name="Blank Slide">
     <p:spTree>
       <p:nvGrpSpPr>
@@ -38,11 +133,14 @@
       </p:grpSpPr>
     </p:spTree>
   </p:cSld>
+  <p:clrMapOvr>
+    <a:masterClrMapping/>
+  </p:clrMapOvr>
 </p:sldLayout>
 </file>
 
 <file path=ppt/slideLayouts/slideLayout10.xml><?xml version="1.0" encoding="utf-8"?>
-<p:sldLayout xmlns:a="http://schemas.openxmlformats.org/drawingml/2006/main" xmlns:p="http://schemas.openxmlformats.org/presentationml/2006/main" xmlns:r="http://schemas.openxmlformats.org/officeDocument/2006/relationships" preserve="1" type="objOverTx">
+<p:sldLayout xmlns:a="http://schemas.openxmlformats.org/drawingml/2006/main" xmlns:r="http://schemas.openxmlformats.org/officeDocument/2006/relationships" xmlns:p="http://schemas.openxmlformats.org/presentationml/2006/main" type="objOverTx" preserve="1">
   <p:cSld name="Title, Content over Content">
     <p:spTree>
       <p:nvGrpSpPr>
@@ -78,7 +176,8 @@
           </a:prstGeom>
         </p:spPr>
         <p:txBody>
-          <a:bodyPr anchor="ctr" bIns="0" lIns="0" rIns="0" tIns="0" wrap="none"/>
+          <a:bodyPr wrap="none" lIns="0" tIns="0" rIns="0" bIns="0" anchor="ctr"/>
+          <a:lstStyle/>
           <a:p>
             <a:endParaRPr/>
           </a:p>
@@ -104,7 +203,8 @@
           </a:prstGeom>
         </p:spPr>
         <p:txBody>
-          <a:bodyPr bIns="0" lIns="0" rIns="0" tIns="0" wrap="none"/>
+          <a:bodyPr wrap="none" lIns="0" tIns="0" rIns="0" bIns="0"/>
+          <a:lstStyle/>
           <a:p>
             <a:endParaRPr/>
           </a:p>
@@ -130,7 +230,8 @@
           </a:prstGeom>
         </p:spPr>
         <p:txBody>
-          <a:bodyPr bIns="0" lIns="0" rIns="0" tIns="0" wrap="none"/>
+          <a:bodyPr wrap="none" lIns="0" tIns="0" rIns="0" bIns="0"/>
+          <a:lstStyle/>
           <a:p>
             <a:endParaRPr/>
           </a:p>
@@ -138,11 +239,14 @@
       </p:sp>
     </p:spTree>
   </p:cSld>
+  <p:clrMapOvr>
+    <a:masterClrMapping/>
+  </p:clrMapOvr>
 </p:sldLayout>
 </file>
 
 <file path=ppt/slideLayouts/slideLayout11.xml><?xml version="1.0" encoding="utf-8"?>
-<p:sldLayout xmlns:a="http://schemas.openxmlformats.org/drawingml/2006/main" xmlns:p="http://schemas.openxmlformats.org/presentationml/2006/main" xmlns:r="http://schemas.openxmlformats.org/officeDocument/2006/relationships" preserve="1" type="fourObj">
+<p:sldLayout xmlns:a="http://schemas.openxmlformats.org/drawingml/2006/main" xmlns:r="http://schemas.openxmlformats.org/officeDocument/2006/relationships" xmlns:p="http://schemas.openxmlformats.org/presentationml/2006/main" type="fourObj" preserve="1">
   <p:cSld name="Title, 4 Content">
     <p:spTree>
       <p:nvGrpSpPr>
@@ -178,7 +282,8 @@
           </a:prstGeom>
         </p:spPr>
         <p:txBody>
-          <a:bodyPr anchor="ctr" bIns="0" lIns="0" rIns="0" tIns="0" wrap="none"/>
+          <a:bodyPr wrap="none" lIns="0" tIns="0" rIns="0" bIns="0" anchor="ctr"/>
+          <a:lstStyle/>
           <a:p>
             <a:endParaRPr/>
           </a:p>
@@ -204,7 +309,8 @@
           </a:prstGeom>
         </p:spPr>
         <p:txBody>
-          <a:bodyPr bIns="0" lIns="0" rIns="0" tIns="0" wrap="none"/>
+          <a:bodyPr wrap="none" lIns="0" tIns="0" rIns="0" bIns="0"/>
+          <a:lstStyle/>
           <a:p>
             <a:endParaRPr/>
           </a:p>
@@ -230,7 +336,8 @@
           </a:prstGeom>
         </p:spPr>
         <p:txBody>
-          <a:bodyPr bIns="0" lIns="0" rIns="0" tIns="0" wrap="none"/>
+          <a:bodyPr wrap="none" lIns="0" tIns="0" rIns="0" bIns="0"/>
+          <a:lstStyle/>
           <a:p>
             <a:endParaRPr/>
           </a:p>
@@ -256,7 +363,8 @@
           </a:prstGeom>
         </p:spPr>
         <p:txBody>
-          <a:bodyPr bIns="0" lIns="0" rIns="0" tIns="0" wrap="none"/>
+          <a:bodyPr wrap="none" lIns="0" tIns="0" rIns="0" bIns="0"/>
+          <a:lstStyle/>
           <a:p>
             <a:endParaRPr/>
           </a:p>
@@ -282,7 +390,8 @@
           </a:prstGeom>
         </p:spPr>
         <p:txBody>
-          <a:bodyPr bIns="0" lIns="0" rIns="0" tIns="0" wrap="none"/>
+          <a:bodyPr wrap="none" lIns="0" tIns="0" rIns="0" bIns="0"/>
+          <a:lstStyle/>
           <a:p>
             <a:endParaRPr/>
           </a:p>
@@ -290,11 +399,14 @@
       </p:sp>
     </p:spTree>
   </p:cSld>
+  <p:clrMapOvr>
+    <a:masterClrMapping/>
+  </p:clrMapOvr>
 </p:sldLayout>
 </file>
 
 <file path=ppt/slideLayouts/slideLayout12.xml><?xml version="1.0" encoding="utf-8"?>
-<p:sldLayout xmlns:a="http://schemas.openxmlformats.org/drawingml/2006/main" xmlns:p="http://schemas.openxmlformats.org/presentationml/2006/main" xmlns:r="http://schemas.openxmlformats.org/officeDocument/2006/relationships" preserve="1" type="blank">
+<p:sldLayout xmlns:a="http://schemas.openxmlformats.org/drawingml/2006/main" xmlns:r="http://schemas.openxmlformats.org/officeDocument/2006/relationships" xmlns:p="http://schemas.openxmlformats.org/presentationml/2006/main" type="blank" preserve="1">
   <p:cSld name="Title, 6 Content">
     <p:spTree>
       <p:nvGrpSpPr>
@@ -330,7 +442,8 @@
           </a:prstGeom>
         </p:spPr>
         <p:txBody>
-          <a:bodyPr anchor="ctr" bIns="0" lIns="0" rIns="0" tIns="0" wrap="none"/>
+          <a:bodyPr wrap="none" lIns="0" tIns="0" rIns="0" bIns="0" anchor="ctr"/>
+          <a:lstStyle/>
           <a:p>
             <a:endParaRPr/>
           </a:p>
@@ -356,7 +469,8 @@
           </a:prstGeom>
         </p:spPr>
         <p:txBody>
-          <a:bodyPr bIns="0" lIns="0" rIns="0" tIns="0" wrap="none"/>
+          <a:bodyPr wrap="none" lIns="0" tIns="0" rIns="0" bIns="0"/>
+          <a:lstStyle/>
           <a:p>
             <a:endParaRPr/>
           </a:p>
@@ -382,7 +496,8 @@
           </a:prstGeom>
         </p:spPr>
         <p:txBody>
-          <a:bodyPr bIns="0" lIns="0" rIns="0" tIns="0" wrap="none"/>
+          <a:bodyPr wrap="none" lIns="0" tIns="0" rIns="0" bIns="0"/>
+          <a:lstStyle/>
           <a:p>
             <a:endParaRPr/>
           </a:p>
@@ -390,11 +505,14 @@
       </p:sp>
     </p:spTree>
   </p:cSld>
+  <p:clrMapOvr>
+    <a:masterClrMapping/>
+  </p:clrMapOvr>
 </p:sldLayout>
 </file>
 
 <file path=ppt/slideLayouts/slideLayout13.xml><?xml version="1.0" encoding="utf-8"?>
-<p:sldLayout xmlns:a="http://schemas.openxmlformats.org/drawingml/2006/main" xmlns:p="http://schemas.openxmlformats.org/presentationml/2006/main" xmlns:r="http://schemas.openxmlformats.org/officeDocument/2006/relationships" preserve="1" type="blank">
+<p:sldLayout xmlns:a="http://schemas.openxmlformats.org/drawingml/2006/main" xmlns:r="http://schemas.openxmlformats.org/officeDocument/2006/relationships" xmlns:p="http://schemas.openxmlformats.org/presentationml/2006/main" type="blank" preserve="1">
   <p:cSld name="Blank Slide">
     <p:spTree>
       <p:nvGrpSpPr>
@@ -412,11 +530,14 @@
       </p:grpSpPr>
     </p:spTree>
   </p:cSld>
+  <p:clrMapOvr>
+    <a:masterClrMapping/>
+  </p:clrMapOvr>
 </p:sldLayout>
 </file>
 
 <file path=ppt/slideLayouts/slideLayout14.xml><?xml version="1.0" encoding="utf-8"?>
-<p:sldLayout xmlns:a="http://schemas.openxmlformats.org/drawingml/2006/main" xmlns:p="http://schemas.openxmlformats.org/presentationml/2006/main" xmlns:r="http://schemas.openxmlformats.org/officeDocument/2006/relationships" preserve="1" type="tx">
+<p:sldLayout xmlns:a="http://schemas.openxmlformats.org/drawingml/2006/main" xmlns:r="http://schemas.openxmlformats.org/officeDocument/2006/relationships" xmlns:p="http://schemas.openxmlformats.org/presentationml/2006/main" type="tx" preserve="1">
   <p:cSld name="Title Slide">
     <p:spTree>
       <p:nvGrpSpPr>
@@ -452,7 +573,8 @@
           </a:prstGeom>
         </p:spPr>
         <p:txBody>
-          <a:bodyPr anchor="ctr" bIns="0" lIns="0" rIns="0" tIns="0" wrap="none"/>
+          <a:bodyPr wrap="none" lIns="0" tIns="0" rIns="0" bIns="0" anchor="ctr"/>
+          <a:lstStyle/>
           <a:p>
             <a:endParaRPr/>
           </a:p>
@@ -478,7 +600,8 @@
           </a:prstGeom>
         </p:spPr>
         <p:txBody>
-          <a:bodyPr anchor="ctr" bIns="0" lIns="0" rIns="0" tIns="0" wrap="none"/>
+          <a:bodyPr wrap="none" lIns="0" tIns="0" rIns="0" bIns="0" anchor="ctr"/>
+          <a:lstStyle/>
           <a:p>
             <a:pPr algn="ctr"/>
             <a:endParaRPr/>
@@ -487,11 +610,14 @@
       </p:sp>
     </p:spTree>
   </p:cSld>
+  <p:clrMapOvr>
+    <a:masterClrMapping/>
+  </p:clrMapOvr>
 </p:sldLayout>
 </file>
 
 <file path=ppt/slideLayouts/slideLayout15.xml><?xml version="1.0" encoding="utf-8"?>
-<p:sldLayout xmlns:a="http://schemas.openxmlformats.org/drawingml/2006/main" xmlns:p="http://schemas.openxmlformats.org/presentationml/2006/main" xmlns:r="http://schemas.openxmlformats.org/officeDocument/2006/relationships" preserve="1" type="obj">
+<p:sldLayout xmlns:a="http://schemas.openxmlformats.org/drawingml/2006/main" xmlns:r="http://schemas.openxmlformats.org/officeDocument/2006/relationships" xmlns:p="http://schemas.openxmlformats.org/presentationml/2006/main" type="obj" preserve="1">
   <p:cSld name="Title, Content">
     <p:spTree>
       <p:nvGrpSpPr>
@@ -527,7 +653,8 @@
           </a:prstGeom>
         </p:spPr>
         <p:txBody>
-          <a:bodyPr anchor="ctr" bIns="0" lIns="0" rIns="0" tIns="0" wrap="none"/>
+          <a:bodyPr wrap="none" lIns="0" tIns="0" rIns="0" bIns="0" anchor="ctr"/>
+          <a:lstStyle/>
           <a:p>
             <a:endParaRPr/>
           </a:p>
@@ -553,7 +680,8 @@
           </a:prstGeom>
         </p:spPr>
         <p:txBody>
-          <a:bodyPr bIns="0" lIns="0" rIns="0" tIns="0" wrap="none"/>
+          <a:bodyPr wrap="none" lIns="0" tIns="0" rIns="0" bIns="0"/>
+          <a:lstStyle/>
           <a:p>
             <a:endParaRPr/>
           </a:p>
@@ -561,11 +689,14 @@
       </p:sp>
     </p:spTree>
   </p:cSld>
+  <p:clrMapOvr>
+    <a:masterClrMapping/>
+  </p:clrMapOvr>
 </p:sldLayout>
 </file>
 
 <file path=ppt/slideLayouts/slideLayout16.xml><?xml version="1.0" encoding="utf-8"?>
-<p:sldLayout xmlns:a="http://schemas.openxmlformats.org/drawingml/2006/main" xmlns:p="http://schemas.openxmlformats.org/presentationml/2006/main" xmlns:r="http://schemas.openxmlformats.org/officeDocument/2006/relationships" preserve="1" type="twoObj">
+<p:sldLayout xmlns:a="http://schemas.openxmlformats.org/drawingml/2006/main" xmlns:r="http://schemas.openxmlformats.org/officeDocument/2006/relationships" xmlns:p="http://schemas.openxmlformats.org/presentationml/2006/main" type="twoObj" preserve="1">
   <p:cSld name="Title, 2 Content">
     <p:spTree>
       <p:nvGrpSpPr>
@@ -601,7 +732,8 @@
           </a:prstGeom>
         </p:spPr>
         <p:txBody>
-          <a:bodyPr anchor="ctr" bIns="0" lIns="0" rIns="0" tIns="0" wrap="none"/>
+          <a:bodyPr wrap="none" lIns="0" tIns="0" rIns="0" bIns="0" anchor="ctr"/>
+          <a:lstStyle/>
           <a:p>
             <a:endParaRPr/>
           </a:p>
@@ -627,7 +759,8 @@
           </a:prstGeom>
         </p:spPr>
         <p:txBody>
-          <a:bodyPr bIns="0" lIns="0" rIns="0" tIns="0" wrap="none"/>
+          <a:bodyPr wrap="none" lIns="0" tIns="0" rIns="0" bIns="0"/>
+          <a:lstStyle/>
           <a:p>
             <a:endParaRPr/>
           </a:p>
@@ -653,7 +786,8 @@
           </a:prstGeom>
         </p:spPr>
         <p:txBody>
-          <a:bodyPr bIns="0" lIns="0" rIns="0" tIns="0" wrap="none"/>
+          <a:bodyPr wrap="none" lIns="0" tIns="0" rIns="0" bIns="0"/>
+          <a:lstStyle/>
           <a:p>
             <a:endParaRPr/>
           </a:p>
@@ -661,11 +795,14 @@
       </p:sp>
     </p:spTree>
   </p:cSld>
+  <p:clrMapOvr>
+    <a:masterClrMapping/>
+  </p:clrMapOvr>
 </p:sldLayout>
 </file>
 
 <file path=ppt/slideLayouts/slideLayout17.xml><?xml version="1.0" encoding="utf-8"?>
-<p:sldLayout xmlns:a="http://schemas.openxmlformats.org/drawingml/2006/main" xmlns:p="http://schemas.openxmlformats.org/presentationml/2006/main" xmlns:r="http://schemas.openxmlformats.org/officeDocument/2006/relationships" preserve="1" type="titleOnly">
+<p:sldLayout xmlns:a="http://schemas.openxmlformats.org/drawingml/2006/main" xmlns:r="http://schemas.openxmlformats.org/officeDocument/2006/relationships" xmlns:p="http://schemas.openxmlformats.org/presentationml/2006/main" type="titleOnly" preserve="1">
   <p:cSld name="Title Only">
     <p:spTree>
       <p:nvGrpSpPr>
@@ -701,7 +838,8 @@
           </a:prstGeom>
         </p:spPr>
         <p:txBody>
-          <a:bodyPr anchor="ctr" bIns="0" lIns="0" rIns="0" tIns="0" wrap="none"/>
+          <a:bodyPr wrap="none" lIns="0" tIns="0" rIns="0" bIns="0" anchor="ctr"/>
+          <a:lstStyle/>
           <a:p>
             <a:endParaRPr/>
           </a:p>
@@ -709,11 +847,14 @@
       </p:sp>
     </p:spTree>
   </p:cSld>
+  <p:clrMapOvr>
+    <a:masterClrMapping/>
+  </p:clrMapOvr>
 </p:sldLayout>
 </file>
 
 <file path=ppt/slideLayouts/slideLayout18.xml><?xml version="1.0" encoding="utf-8"?>
-<p:sldLayout xmlns:a="http://schemas.openxmlformats.org/drawingml/2006/main" xmlns:p="http://schemas.openxmlformats.org/presentationml/2006/main" xmlns:r="http://schemas.openxmlformats.org/officeDocument/2006/relationships" preserve="1" type="objOnly">
+<p:sldLayout xmlns:a="http://schemas.openxmlformats.org/drawingml/2006/main" xmlns:r="http://schemas.openxmlformats.org/officeDocument/2006/relationships" xmlns:p="http://schemas.openxmlformats.org/presentationml/2006/main" type="objOnly" preserve="1">
   <p:cSld name="Centered Text">
     <p:spTree>
       <p:nvGrpSpPr>
@@ -749,7 +890,8 @@
           </a:prstGeom>
         </p:spPr>
         <p:txBody>
-          <a:bodyPr anchor="ctr" bIns="0" lIns="0" rIns="0" tIns="0" wrap="none"/>
+          <a:bodyPr wrap="none" lIns="0" tIns="0" rIns="0" bIns="0" anchor="ctr"/>
+          <a:lstStyle/>
           <a:p>
             <a:pPr algn="ctr"/>
             <a:endParaRPr/>
@@ -758,11 +900,14 @@
       </p:sp>
     </p:spTree>
   </p:cSld>
+  <p:clrMapOvr>
+    <a:masterClrMapping/>
+  </p:clrMapOvr>
 </p:sldLayout>
 </file>
 
 <file path=ppt/slideLayouts/slideLayout19.xml><?xml version="1.0" encoding="utf-8"?>
-<p:sldLayout xmlns:a="http://schemas.openxmlformats.org/drawingml/2006/main" xmlns:p="http://schemas.openxmlformats.org/presentationml/2006/main" xmlns:r="http://schemas.openxmlformats.org/officeDocument/2006/relationships" preserve="1" type="twoObjAndObj">
+<p:sldLayout xmlns:a="http://schemas.openxmlformats.org/drawingml/2006/main" xmlns:r="http://schemas.openxmlformats.org/officeDocument/2006/relationships" xmlns:p="http://schemas.openxmlformats.org/presentationml/2006/main" type="twoObjAndObj" preserve="1">
   <p:cSld name="Title, 2 Content and Content">
     <p:spTree>
       <p:nvGrpSpPr>
@@ -798,7 +943,8 @@
           </a:prstGeom>
         </p:spPr>
         <p:txBody>
-          <a:bodyPr anchor="ctr" bIns="0" lIns="0" rIns="0" tIns="0" wrap="none"/>
+          <a:bodyPr wrap="none" lIns="0" tIns="0" rIns="0" bIns="0" anchor="ctr"/>
+          <a:lstStyle/>
           <a:p>
             <a:endParaRPr/>
           </a:p>
@@ -824,7 +970,8 @@
           </a:prstGeom>
         </p:spPr>
         <p:txBody>
-          <a:bodyPr bIns="0" lIns="0" rIns="0" tIns="0" wrap="none"/>
+          <a:bodyPr wrap="none" lIns="0" tIns="0" rIns="0" bIns="0"/>
+          <a:lstStyle/>
           <a:p>
             <a:endParaRPr/>
           </a:p>
@@ -850,7 +997,8 @@
           </a:prstGeom>
         </p:spPr>
         <p:txBody>
-          <a:bodyPr bIns="0" lIns="0" rIns="0" tIns="0" wrap="none"/>
+          <a:bodyPr wrap="none" lIns="0" tIns="0" rIns="0" bIns="0"/>
+          <a:lstStyle/>
           <a:p>
             <a:endParaRPr/>
           </a:p>
@@ -876,7 +1024,8 @@
           </a:prstGeom>
         </p:spPr>
         <p:txBody>
-          <a:bodyPr bIns="0" lIns="0" rIns="0" tIns="0" wrap="none"/>
+          <a:bodyPr wrap="none" lIns="0" tIns="0" rIns="0" bIns="0"/>
+          <a:lstStyle/>
           <a:p>
             <a:endParaRPr/>
           </a:p>
@@ -884,11 +1033,14 @@
       </p:sp>
     </p:spTree>
   </p:cSld>
+  <p:clrMapOvr>
+    <a:masterClrMapping/>
+  </p:clrMapOvr>
 </p:sldLayout>
 </file>
 
 <file path=ppt/slideLayouts/slideLayout2.xml><?xml version="1.0" encoding="utf-8"?>
-<p:sldLayout xmlns:a="http://schemas.openxmlformats.org/drawingml/2006/main" xmlns:p="http://schemas.openxmlformats.org/presentationml/2006/main" xmlns:r="http://schemas.openxmlformats.org/officeDocument/2006/relationships" preserve="1" type="tx">
+<p:sldLayout xmlns:a="http://schemas.openxmlformats.org/drawingml/2006/main" xmlns:r="http://schemas.openxmlformats.org/officeDocument/2006/relationships" xmlns:p="http://schemas.openxmlformats.org/presentationml/2006/main" type="tx" preserve="1">
   <p:cSld name="Title Slide">
     <p:spTree>
       <p:nvGrpSpPr>
@@ -924,7 +1076,8 @@
           </a:prstGeom>
         </p:spPr>
         <p:txBody>
-          <a:bodyPr anchor="ctr" bIns="0" lIns="0" rIns="0" tIns="0" wrap="none"/>
+          <a:bodyPr wrap="none" lIns="0" tIns="0" rIns="0" bIns="0" anchor="ctr"/>
+          <a:lstStyle/>
           <a:p>
             <a:endParaRPr/>
           </a:p>
@@ -950,7 +1103,8 @@
           </a:prstGeom>
         </p:spPr>
         <p:txBody>
-          <a:bodyPr anchor="ctr" bIns="0" lIns="0" rIns="0" tIns="0" wrap="none"/>
+          <a:bodyPr wrap="none" lIns="0" tIns="0" rIns="0" bIns="0" anchor="ctr"/>
+          <a:lstStyle/>
           <a:p>
             <a:pPr algn="ctr"/>
             <a:endParaRPr/>
@@ -959,11 +1113,14 @@
       </p:sp>
     </p:spTree>
   </p:cSld>
+  <p:clrMapOvr>
+    <a:masterClrMapping/>
+  </p:clrMapOvr>
 </p:sldLayout>
 </file>
 
 <file path=ppt/slideLayouts/slideLayout20.xml><?xml version="1.0" encoding="utf-8"?>
-<p:sldLayout xmlns:a="http://schemas.openxmlformats.org/drawingml/2006/main" xmlns:p="http://schemas.openxmlformats.org/presentationml/2006/main" xmlns:r="http://schemas.openxmlformats.org/officeDocument/2006/relationships" preserve="1" type="objAndTwoObj">
+<p:sldLayout xmlns:a="http://schemas.openxmlformats.org/drawingml/2006/main" xmlns:r="http://schemas.openxmlformats.org/officeDocument/2006/relationships" xmlns:p="http://schemas.openxmlformats.org/presentationml/2006/main" type="objAndTwoObj" preserve="1">
   <p:cSld name="Title Content and 2 Content">
     <p:spTree>
       <p:nvGrpSpPr>
@@ -999,7 +1156,8 @@
           </a:prstGeom>
         </p:spPr>
         <p:txBody>
-          <a:bodyPr anchor="ctr" bIns="0" lIns="0" rIns="0" tIns="0" wrap="none"/>
+          <a:bodyPr wrap="none" lIns="0" tIns="0" rIns="0" bIns="0" anchor="ctr"/>
+          <a:lstStyle/>
           <a:p>
             <a:endParaRPr/>
           </a:p>
@@ -1025,7 +1183,8 @@
           </a:prstGeom>
         </p:spPr>
         <p:txBody>
-          <a:bodyPr bIns="0" lIns="0" rIns="0" tIns="0" wrap="none"/>
+          <a:bodyPr wrap="none" lIns="0" tIns="0" rIns="0" bIns="0"/>
+          <a:lstStyle/>
           <a:p>
             <a:endParaRPr/>
           </a:p>
@@ -1051,7 +1210,8 @@
           </a:prstGeom>
         </p:spPr>
         <p:txBody>
-          <a:bodyPr bIns="0" lIns="0" rIns="0" tIns="0" wrap="none"/>
+          <a:bodyPr wrap="none" lIns="0" tIns="0" rIns="0" bIns="0"/>
+          <a:lstStyle/>
           <a:p>
             <a:endParaRPr/>
           </a:p>
@@ -1077,7 +1237,8 @@
           </a:prstGeom>
         </p:spPr>
         <p:txBody>
-          <a:bodyPr bIns="0" lIns="0" rIns="0" tIns="0" wrap="none"/>
+          <a:bodyPr wrap="none" lIns="0" tIns="0" rIns="0" bIns="0"/>
+          <a:lstStyle/>
           <a:p>
             <a:endParaRPr/>
           </a:p>
@@ -1085,11 +1246,14 @@
       </p:sp>
     </p:spTree>
   </p:cSld>
+  <p:clrMapOvr>
+    <a:masterClrMapping/>
+  </p:clrMapOvr>
 </p:sldLayout>
 </file>
 
 <file path=ppt/slideLayouts/slideLayout21.xml><?xml version="1.0" encoding="utf-8"?>
-<p:sldLayout xmlns:a="http://schemas.openxmlformats.org/drawingml/2006/main" xmlns:p="http://schemas.openxmlformats.org/presentationml/2006/main" xmlns:r="http://schemas.openxmlformats.org/officeDocument/2006/relationships" preserve="1" type="twoObjOverTx">
+<p:sldLayout xmlns:a="http://schemas.openxmlformats.org/drawingml/2006/main" xmlns:r="http://schemas.openxmlformats.org/officeDocument/2006/relationships" xmlns:p="http://schemas.openxmlformats.org/presentationml/2006/main" type="twoObjOverTx" preserve="1">
   <p:cSld name="Title, 2 Content over Content">
     <p:spTree>
       <p:nvGrpSpPr>
@@ -1125,7 +1289,8 @@
           </a:prstGeom>
         </p:spPr>
         <p:txBody>
-          <a:bodyPr anchor="ctr" bIns="0" lIns="0" rIns="0" tIns="0" wrap="none"/>
+          <a:bodyPr wrap="none" lIns="0" tIns="0" rIns="0" bIns="0" anchor="ctr"/>
+          <a:lstStyle/>
           <a:p>
             <a:endParaRPr/>
           </a:p>
@@ -1151,7 +1316,8 @@
           </a:prstGeom>
         </p:spPr>
         <p:txBody>
-          <a:bodyPr bIns="0" lIns="0" rIns="0" tIns="0" wrap="none"/>
+          <a:bodyPr wrap="none" lIns="0" tIns="0" rIns="0" bIns="0"/>
+          <a:lstStyle/>
           <a:p>
             <a:endParaRPr/>
           </a:p>
@@ -1177,7 +1343,8 @@
           </a:prstGeom>
         </p:spPr>
         <p:txBody>
-          <a:bodyPr bIns="0" lIns="0" rIns="0" tIns="0" wrap="none"/>
+          <a:bodyPr wrap="none" lIns="0" tIns="0" rIns="0" bIns="0"/>
+          <a:lstStyle/>
           <a:p>
             <a:endParaRPr/>
           </a:p>
@@ -1203,7 +1370,8 @@
           </a:prstGeom>
         </p:spPr>
         <p:txBody>
-          <a:bodyPr bIns="0" lIns="0" rIns="0" tIns="0" wrap="none"/>
+          <a:bodyPr wrap="none" lIns="0" tIns="0" rIns="0" bIns="0"/>
+          <a:lstStyle/>
           <a:p>
             <a:endParaRPr/>
           </a:p>
@@ -1211,11 +1379,14 @@
       </p:sp>
     </p:spTree>
   </p:cSld>
+  <p:clrMapOvr>
+    <a:masterClrMapping/>
+  </p:clrMapOvr>
 </p:sldLayout>
 </file>
 
 <file path=ppt/slideLayouts/slideLayout22.xml><?xml version="1.0" encoding="utf-8"?>
-<p:sldLayout xmlns:a="http://schemas.openxmlformats.org/drawingml/2006/main" xmlns:p="http://schemas.openxmlformats.org/presentationml/2006/main" xmlns:r="http://schemas.openxmlformats.org/officeDocument/2006/relationships" preserve="1" type="objOverTx">
+<p:sldLayout xmlns:a="http://schemas.openxmlformats.org/drawingml/2006/main" xmlns:r="http://schemas.openxmlformats.org/officeDocument/2006/relationships" xmlns:p="http://schemas.openxmlformats.org/presentationml/2006/main" type="objOverTx" preserve="1">
   <p:cSld name="Title, Content over Content">
     <p:spTree>
       <p:nvGrpSpPr>
@@ -1251,7 +1422,8 @@
           </a:prstGeom>
         </p:spPr>
         <p:txBody>
-          <a:bodyPr anchor="ctr" bIns="0" lIns="0" rIns="0" tIns="0" wrap="none"/>
+          <a:bodyPr wrap="none" lIns="0" tIns="0" rIns="0" bIns="0" anchor="ctr"/>
+          <a:lstStyle/>
           <a:p>
             <a:endParaRPr/>
           </a:p>
@@ -1277,7 +1449,8 @@
           </a:prstGeom>
         </p:spPr>
         <p:txBody>
-          <a:bodyPr bIns="0" lIns="0" rIns="0" tIns="0" wrap="none"/>
+          <a:bodyPr wrap="none" lIns="0" tIns="0" rIns="0" bIns="0"/>
+          <a:lstStyle/>
           <a:p>
             <a:endParaRPr/>
           </a:p>
@@ -1303,7 +1476,8 @@
           </a:prstGeom>
         </p:spPr>
         <p:txBody>
-          <a:bodyPr bIns="0" lIns="0" rIns="0" tIns="0" wrap="none"/>
+          <a:bodyPr wrap="none" lIns="0" tIns="0" rIns="0" bIns="0"/>
+          <a:lstStyle/>
           <a:p>
             <a:endParaRPr/>
           </a:p>
@@ -1311,11 +1485,14 @@
       </p:sp>
     </p:spTree>
   </p:cSld>
+  <p:clrMapOvr>
+    <a:masterClrMapping/>
+  </p:clrMapOvr>
 </p:sldLayout>
 </file>
 
 <file path=ppt/slideLayouts/slideLayout23.xml><?xml version="1.0" encoding="utf-8"?>
-<p:sldLayout xmlns:a="http://schemas.openxmlformats.org/drawingml/2006/main" xmlns:p="http://schemas.openxmlformats.org/presentationml/2006/main" xmlns:r="http://schemas.openxmlformats.org/officeDocument/2006/relationships" preserve="1" type="fourObj">
+<p:sldLayout xmlns:a="http://schemas.openxmlformats.org/drawingml/2006/main" xmlns:r="http://schemas.openxmlformats.org/officeDocument/2006/relationships" xmlns:p="http://schemas.openxmlformats.org/presentationml/2006/main" type="fourObj" preserve="1">
   <p:cSld name="Title, 4 Content">
     <p:spTree>
       <p:nvGrpSpPr>
@@ -1351,7 +1528,8 @@
           </a:prstGeom>
         </p:spPr>
         <p:txBody>
-          <a:bodyPr anchor="ctr" bIns="0" lIns="0" rIns="0" tIns="0" wrap="none"/>
+          <a:bodyPr wrap="none" lIns="0" tIns="0" rIns="0" bIns="0" anchor="ctr"/>
+          <a:lstStyle/>
           <a:p>
             <a:endParaRPr/>
           </a:p>
@@ -1377,7 +1555,8 @@
           </a:prstGeom>
         </p:spPr>
         <p:txBody>
-          <a:bodyPr bIns="0" lIns="0" rIns="0" tIns="0" wrap="none"/>
+          <a:bodyPr wrap="none" lIns="0" tIns="0" rIns="0" bIns="0"/>
+          <a:lstStyle/>
           <a:p>
             <a:endParaRPr/>
           </a:p>
@@ -1403,7 +1582,8 @@
           </a:prstGeom>
         </p:spPr>
         <p:txBody>
-          <a:bodyPr bIns="0" lIns="0" rIns="0" tIns="0" wrap="none"/>
+          <a:bodyPr wrap="none" lIns="0" tIns="0" rIns="0" bIns="0"/>
+          <a:lstStyle/>
           <a:p>
             <a:endParaRPr/>
           </a:p>
@@ -1429,7 +1609,8 @@
           </a:prstGeom>
         </p:spPr>
         <p:txBody>
-          <a:bodyPr bIns="0" lIns="0" rIns="0" tIns="0" wrap="none"/>
+          <a:bodyPr wrap="none" lIns="0" tIns="0" rIns="0" bIns="0"/>
+          <a:lstStyle/>
           <a:p>
             <a:endParaRPr/>
           </a:p>
@@ -1455,7 +1636,8 @@
           </a:prstGeom>
         </p:spPr>
         <p:txBody>
-          <a:bodyPr bIns="0" lIns="0" rIns="0" tIns="0" wrap="none"/>
+          <a:bodyPr wrap="none" lIns="0" tIns="0" rIns="0" bIns="0"/>
+          <a:lstStyle/>
           <a:p>
             <a:endParaRPr/>
           </a:p>
@@ -1463,11 +1645,14 @@
       </p:sp>
     </p:spTree>
   </p:cSld>
+  <p:clrMapOvr>
+    <a:masterClrMapping/>
+  </p:clrMapOvr>
 </p:sldLayout>
 </file>
 
 <file path=ppt/slideLayouts/slideLayout24.xml><?xml version="1.0" encoding="utf-8"?>
-<p:sldLayout xmlns:a="http://schemas.openxmlformats.org/drawingml/2006/main" xmlns:p="http://schemas.openxmlformats.org/presentationml/2006/main" xmlns:r="http://schemas.openxmlformats.org/officeDocument/2006/relationships" preserve="1" type="blank">
+<p:sldLayout xmlns:a="http://schemas.openxmlformats.org/drawingml/2006/main" xmlns:r="http://schemas.openxmlformats.org/officeDocument/2006/relationships" xmlns:p="http://schemas.openxmlformats.org/presentationml/2006/main" type="blank" preserve="1">
   <p:cSld name="Title, 6 Content">
     <p:spTree>
       <p:nvGrpSpPr>
@@ -1503,7 +1688,8 @@
           </a:prstGeom>
         </p:spPr>
         <p:txBody>
-          <a:bodyPr anchor="ctr" bIns="0" lIns="0" rIns="0" tIns="0" wrap="none"/>
+          <a:bodyPr wrap="none" lIns="0" tIns="0" rIns="0" bIns="0" anchor="ctr"/>
+          <a:lstStyle/>
           <a:p>
             <a:endParaRPr/>
           </a:p>
@@ -1529,7 +1715,8 @@
           </a:prstGeom>
         </p:spPr>
         <p:txBody>
-          <a:bodyPr bIns="0" lIns="0" rIns="0" tIns="0" wrap="none"/>
+          <a:bodyPr wrap="none" lIns="0" tIns="0" rIns="0" bIns="0"/>
+          <a:lstStyle/>
           <a:p>
             <a:endParaRPr/>
           </a:p>
@@ -1555,7 +1742,8 @@
           </a:prstGeom>
         </p:spPr>
         <p:txBody>
-          <a:bodyPr bIns="0" lIns="0" rIns="0" tIns="0" wrap="none"/>
+          <a:bodyPr wrap="none" lIns="0" tIns="0" rIns="0" bIns="0"/>
+          <a:lstStyle/>
           <a:p>
             <a:endParaRPr/>
           </a:p>
@@ -1563,11 +1751,14 @@
       </p:sp>
     </p:spTree>
   </p:cSld>
+  <p:clrMapOvr>
+    <a:masterClrMapping/>
+  </p:clrMapOvr>
 </p:sldLayout>
 </file>
 
 <file path=ppt/slideLayouts/slideLayout3.xml><?xml version="1.0" encoding="utf-8"?>
-<p:sldLayout xmlns:a="http://schemas.openxmlformats.org/drawingml/2006/main" xmlns:p="http://schemas.openxmlformats.org/presentationml/2006/main" xmlns:r="http://schemas.openxmlformats.org/officeDocument/2006/relationships" preserve="1" type="obj">
+<p:sldLayout xmlns:a="http://schemas.openxmlformats.org/drawingml/2006/main" xmlns:r="http://schemas.openxmlformats.org/officeDocument/2006/relationships" xmlns:p="http://schemas.openxmlformats.org/presentationml/2006/main" type="obj" preserve="1">
   <p:cSld name="Title, Content">
     <p:spTree>
       <p:nvGrpSpPr>
@@ -1603,7 +1794,8 @@
           </a:prstGeom>
         </p:spPr>
         <p:txBody>
-          <a:bodyPr anchor="ctr" bIns="0" lIns="0" rIns="0" tIns="0" wrap="none"/>
+          <a:bodyPr wrap="none" lIns="0" tIns="0" rIns="0" bIns="0" anchor="ctr"/>
+          <a:lstStyle/>
           <a:p>
             <a:endParaRPr/>
           </a:p>
@@ -1629,7 +1821,8 @@
           </a:prstGeom>
         </p:spPr>
         <p:txBody>
-          <a:bodyPr bIns="0" lIns="0" rIns="0" tIns="0" wrap="none"/>
+          <a:bodyPr wrap="none" lIns="0" tIns="0" rIns="0" bIns="0"/>
+          <a:lstStyle/>
           <a:p>
             <a:endParaRPr/>
           </a:p>
@@ -1637,11 +1830,14 @@
       </p:sp>
     </p:spTree>
   </p:cSld>
+  <p:clrMapOvr>
+    <a:masterClrMapping/>
+  </p:clrMapOvr>
 </p:sldLayout>
 </file>
 
 <file path=ppt/slideLayouts/slideLayout4.xml><?xml version="1.0" encoding="utf-8"?>
-<p:sldLayout xmlns:a="http://schemas.openxmlformats.org/drawingml/2006/main" xmlns:p="http://schemas.openxmlformats.org/presentationml/2006/main" xmlns:r="http://schemas.openxmlformats.org/officeDocument/2006/relationships" preserve="1" type="twoObj">
+<p:sldLayout xmlns:a="http://schemas.openxmlformats.org/drawingml/2006/main" xmlns:r="http://schemas.openxmlformats.org/officeDocument/2006/relationships" xmlns:p="http://schemas.openxmlformats.org/presentationml/2006/main" type="twoObj" preserve="1">
   <p:cSld name="Title, 2 Content">
     <p:spTree>
       <p:nvGrpSpPr>
@@ -1677,7 +1873,8 @@
           </a:prstGeom>
         </p:spPr>
         <p:txBody>
-          <a:bodyPr anchor="ctr" bIns="0" lIns="0" rIns="0" tIns="0" wrap="none"/>
+          <a:bodyPr wrap="none" lIns="0" tIns="0" rIns="0" bIns="0" anchor="ctr"/>
+          <a:lstStyle/>
           <a:p>
             <a:endParaRPr/>
           </a:p>
@@ -1703,7 +1900,8 @@
           </a:prstGeom>
         </p:spPr>
         <p:txBody>
-          <a:bodyPr bIns="0" lIns="0" rIns="0" tIns="0" wrap="none"/>
+          <a:bodyPr wrap="none" lIns="0" tIns="0" rIns="0" bIns="0"/>
+          <a:lstStyle/>
           <a:p>
             <a:endParaRPr/>
           </a:p>
@@ -1729,7 +1927,8 @@
           </a:prstGeom>
         </p:spPr>
         <p:txBody>
-          <a:bodyPr bIns="0" lIns="0" rIns="0" tIns="0" wrap="none"/>
+          <a:bodyPr wrap="none" lIns="0" tIns="0" rIns="0" bIns="0"/>
+          <a:lstStyle/>
           <a:p>
             <a:endParaRPr/>
           </a:p>
@@ -1737,11 +1936,14 @@
       </p:sp>
     </p:spTree>
   </p:cSld>
+  <p:clrMapOvr>
+    <a:masterClrMapping/>
+  </p:clrMapOvr>
 </p:sldLayout>
 </file>
 
 <file path=ppt/slideLayouts/slideLayout5.xml><?xml version="1.0" encoding="utf-8"?>
-<p:sldLayout xmlns:a="http://schemas.openxmlformats.org/drawingml/2006/main" xmlns:p="http://schemas.openxmlformats.org/presentationml/2006/main" xmlns:r="http://schemas.openxmlformats.org/officeDocument/2006/relationships" preserve="1" type="titleOnly">
+<p:sldLayout xmlns:a="http://schemas.openxmlformats.org/drawingml/2006/main" xmlns:r="http://schemas.openxmlformats.org/officeDocument/2006/relationships" xmlns:p="http://schemas.openxmlformats.org/presentationml/2006/main" type="titleOnly" preserve="1">
   <p:cSld name="Title Only">
     <p:spTree>
       <p:nvGrpSpPr>
@@ -1777,7 +1979,8 @@
           </a:prstGeom>
         </p:spPr>
         <p:txBody>
-          <a:bodyPr anchor="ctr" bIns="0" lIns="0" rIns="0" tIns="0" wrap="none"/>
+          <a:bodyPr wrap="none" lIns="0" tIns="0" rIns="0" bIns="0" anchor="ctr"/>
+          <a:lstStyle/>
           <a:p>
             <a:endParaRPr/>
           </a:p>
@@ -1785,11 +1988,14 @@
       </p:sp>
     </p:spTree>
   </p:cSld>
+  <p:clrMapOvr>
+    <a:masterClrMapping/>
+  </p:clrMapOvr>
 </p:sldLayout>
 </file>
 
 <file path=ppt/slideLayouts/slideLayout6.xml><?xml version="1.0" encoding="utf-8"?>
-<p:sldLayout xmlns:a="http://schemas.openxmlformats.org/drawingml/2006/main" xmlns:p="http://schemas.openxmlformats.org/presentationml/2006/main" xmlns:r="http://schemas.openxmlformats.org/officeDocument/2006/relationships" preserve="1" type="objOnly">
+<p:sldLayout xmlns:a="http://schemas.openxmlformats.org/drawingml/2006/main" xmlns:r="http://schemas.openxmlformats.org/officeDocument/2006/relationships" xmlns:p="http://schemas.openxmlformats.org/presentationml/2006/main" type="objOnly" preserve="1">
   <p:cSld name="Centered Text">
     <p:spTree>
       <p:nvGrpSpPr>
@@ -1825,7 +2031,8 @@
           </a:prstGeom>
         </p:spPr>
         <p:txBody>
-          <a:bodyPr anchor="ctr" bIns="0" lIns="0" rIns="0" tIns="0" wrap="none"/>
+          <a:bodyPr wrap="none" lIns="0" tIns="0" rIns="0" bIns="0" anchor="ctr"/>
+          <a:lstStyle/>
           <a:p>
             <a:pPr algn="ctr"/>
             <a:endParaRPr/>
@@ -1834,11 +2041,14 @@
       </p:sp>
     </p:spTree>
   </p:cSld>
+  <p:clrMapOvr>
+    <a:masterClrMapping/>
+  </p:clrMapOvr>
 </p:sldLayout>
 </file>
 
 <file path=ppt/slideLayouts/slideLayout7.xml><?xml version="1.0" encoding="utf-8"?>
-<p:sldLayout xmlns:a="http://schemas.openxmlformats.org/drawingml/2006/main" xmlns:p="http://schemas.openxmlformats.org/presentationml/2006/main" xmlns:r="http://schemas.openxmlformats.org/officeDocument/2006/relationships" preserve="1" type="twoObjAndObj">
+<p:sldLayout xmlns:a="http://schemas.openxmlformats.org/drawingml/2006/main" xmlns:r="http://schemas.openxmlformats.org/officeDocument/2006/relationships" xmlns:p="http://schemas.openxmlformats.org/presentationml/2006/main" type="twoObjAndObj" preserve="1">
   <p:cSld name="Title, 2 Content and Content">
     <p:spTree>
       <p:nvGrpSpPr>
@@ -1874,7 +2084,8 @@
           </a:prstGeom>
         </p:spPr>
         <p:txBody>
-          <a:bodyPr anchor="ctr" bIns="0" lIns="0" rIns="0" tIns="0" wrap="none"/>
+          <a:bodyPr wrap="none" lIns="0" tIns="0" rIns="0" bIns="0" anchor="ctr"/>
+          <a:lstStyle/>
           <a:p>
             <a:endParaRPr/>
           </a:p>
@@ -1900,7 +2111,8 @@
           </a:prstGeom>
         </p:spPr>
         <p:txBody>
-          <a:bodyPr bIns="0" lIns="0" rIns="0" tIns="0" wrap="none"/>
+          <a:bodyPr wrap="none" lIns="0" tIns="0" rIns="0" bIns="0"/>
+          <a:lstStyle/>
           <a:p>
             <a:endParaRPr/>
           </a:p>
@@ -1926,7 +2138,8 @@
           </a:prstGeom>
         </p:spPr>
         <p:txBody>
-          <a:bodyPr bIns="0" lIns="0" rIns="0" tIns="0" wrap="none"/>
+          <a:bodyPr wrap="none" lIns="0" tIns="0" rIns="0" bIns="0"/>
+          <a:lstStyle/>
           <a:p>
             <a:endParaRPr/>
           </a:p>
@@ -1952,7 +2165,8 @@
           </a:prstGeom>
         </p:spPr>
         <p:txBody>
-          <a:bodyPr bIns="0" lIns="0" rIns="0" tIns="0" wrap="none"/>
+          <a:bodyPr wrap="none" lIns="0" tIns="0" rIns="0" bIns="0"/>
+          <a:lstStyle/>
           <a:p>
             <a:endParaRPr/>
           </a:p>
@@ -1960,11 +2174,14 @@
       </p:sp>
     </p:spTree>
   </p:cSld>
+  <p:clrMapOvr>
+    <a:masterClrMapping/>
+  </p:clrMapOvr>
 </p:sldLayout>
 </file>
 
 <file path=ppt/slideLayouts/slideLayout8.xml><?xml version="1.0" encoding="utf-8"?>
-<p:sldLayout xmlns:a="http://schemas.openxmlformats.org/drawingml/2006/main" xmlns:p="http://schemas.openxmlformats.org/presentationml/2006/main" xmlns:r="http://schemas.openxmlformats.org/officeDocument/2006/relationships" preserve="1" type="objAndTwoObj">
+<p:sldLayout xmlns:a="http://schemas.openxmlformats.org/drawingml/2006/main" xmlns:r="http://schemas.openxmlformats.org/officeDocument/2006/relationships" xmlns:p="http://schemas.openxmlformats.org/presentationml/2006/main" type="objAndTwoObj" preserve="1">
   <p:cSld name="Title Content and 2 Content">
     <p:spTree>
       <p:nvGrpSpPr>
@@ -2000,7 +2217,8 @@
           </a:prstGeom>
         </p:spPr>
         <p:txBody>
-          <a:bodyPr anchor="ctr" bIns="0" lIns="0" rIns="0" tIns="0" wrap="none"/>
+          <a:bodyPr wrap="none" lIns="0" tIns="0" rIns="0" bIns="0" anchor="ctr"/>
+          <a:lstStyle/>
           <a:p>
             <a:endParaRPr/>
           </a:p>
@@ -2026,7 +2244,8 @@
           </a:prstGeom>
         </p:spPr>
         <p:txBody>
-          <a:bodyPr bIns="0" lIns="0" rIns="0" tIns="0" wrap="none"/>
+          <a:bodyPr wrap="none" lIns="0" tIns="0" rIns="0" bIns="0"/>
+          <a:lstStyle/>
           <a:p>
             <a:endParaRPr/>
           </a:p>
@@ -2052,7 +2271,8 @@
           </a:prstGeom>
         </p:spPr>
         <p:txBody>
-          <a:bodyPr bIns="0" lIns="0" rIns="0" tIns="0" wrap="none"/>
+          <a:bodyPr wrap="none" lIns="0" tIns="0" rIns="0" bIns="0"/>
+          <a:lstStyle/>
           <a:p>
             <a:endParaRPr/>
           </a:p>
@@ -2078,7 +2298,8 @@
           </a:prstGeom>
         </p:spPr>
         <p:txBody>
-          <a:bodyPr bIns="0" lIns="0" rIns="0" tIns="0" wrap="none"/>
+          <a:bodyPr wrap="none" lIns="0" tIns="0" rIns="0" bIns="0"/>
+          <a:lstStyle/>
           <a:p>
             <a:endParaRPr/>
           </a:p>
@@ -2086,11 +2307,14 @@
       </p:sp>
     </p:spTree>
   </p:cSld>
+  <p:clrMapOvr>
+    <a:masterClrMapping/>
+  </p:clrMapOvr>
 </p:sldLayout>
 </file>
 
 <file path=ppt/slideLayouts/slideLayout9.xml><?xml version="1.0" encoding="utf-8"?>
-<p:sldLayout xmlns:a="http://schemas.openxmlformats.org/drawingml/2006/main" xmlns:p="http://schemas.openxmlformats.org/presentationml/2006/main" xmlns:r="http://schemas.openxmlformats.org/officeDocument/2006/relationships" preserve="1" type="twoObjOverTx">
+<p:sldLayout xmlns:a="http://schemas.openxmlformats.org/drawingml/2006/main" xmlns:r="http://schemas.openxmlformats.org/officeDocument/2006/relationships" xmlns:p="http://schemas.openxmlformats.org/presentationml/2006/main" type="twoObjOverTx" preserve="1">
   <p:cSld name="Title, 2 Content over Content">
     <p:spTree>
       <p:nvGrpSpPr>
@@ -2126,7 +2350,8 @@
           </a:prstGeom>
         </p:spPr>
         <p:txBody>
-          <a:bodyPr anchor="ctr" bIns="0" lIns="0" rIns="0" tIns="0" wrap="none"/>
+          <a:bodyPr wrap="none" lIns="0" tIns="0" rIns="0" bIns="0" anchor="ctr"/>
+          <a:lstStyle/>
           <a:p>
             <a:endParaRPr/>
           </a:p>
@@ -2152,7 +2377,8 @@
           </a:prstGeom>
         </p:spPr>
         <p:txBody>
-          <a:bodyPr bIns="0" lIns="0" rIns="0" tIns="0" wrap="none"/>
+          <a:bodyPr wrap="none" lIns="0" tIns="0" rIns="0" bIns="0"/>
+          <a:lstStyle/>
           <a:p>
             <a:endParaRPr/>
           </a:p>
@@ -2178,7 +2404,8 @@
           </a:prstGeom>
         </p:spPr>
         <p:txBody>
-          <a:bodyPr bIns="0" lIns="0" rIns="0" tIns="0" wrap="none"/>
+          <a:bodyPr wrap="none" lIns="0" tIns="0" rIns="0" bIns="0"/>
+          <a:lstStyle/>
           <a:p>
             <a:endParaRPr/>
           </a:p>
@@ -2204,7 +2431,8 @@
           </a:prstGeom>
         </p:spPr>
         <p:txBody>
-          <a:bodyPr bIns="0" lIns="0" rIns="0" tIns="0" wrap="none"/>
+          <a:bodyPr wrap="none" lIns="0" tIns="0" rIns="0" bIns="0"/>
+          <a:lstStyle/>
           <a:p>
             <a:endParaRPr/>
           </a:p>
@@ -2212,17 +2440,21 @@
       </p:sp>
     </p:spTree>
   </p:cSld>
+  <p:clrMapOvr>
+    <a:masterClrMapping/>
+  </p:clrMapOvr>
 </p:sldLayout>
 </file>
 
 <file path=ppt/slideMasters/slideMaster1.xml><?xml version="1.0" encoding="utf-8"?>
-<p:sldMaster xmlns:a="http://schemas.openxmlformats.org/drawingml/2006/main" xmlns:p="http://schemas.openxmlformats.org/presentationml/2006/main" xmlns:r="http://schemas.openxmlformats.org/officeDocument/2006/relationships">
+<p:sldMaster xmlns:a="http://schemas.openxmlformats.org/drawingml/2006/main" xmlns:r="http://schemas.openxmlformats.org/officeDocument/2006/relationships" xmlns:p="http://schemas.openxmlformats.org/presentationml/2006/main">
   <p:cSld>
     <p:bg>
       <p:bgPr>
         <a:solidFill>
           <a:srgbClr val="000000"/>
         </a:solidFill>
+        <a:effectLst/>
       </p:bgPr>
     </p:bg>
     <p:spTree>
@@ -2241,7 +2473,7 @@
       </p:grpSpPr>
       <p:sp>
         <p:nvSpPr>
-          <p:cNvPr id="0" name="PlaceHolder 1"/>
+          <p:cNvPr id="5" name="PlaceHolder 1"/>
           <p:cNvSpPr>
             <a:spLocks noGrp="1"/>
           </p:cNvSpPr>
@@ -2260,6 +2492,7 @@
         </p:spPr>
         <p:txBody>
           <a:bodyPr anchor="ctr"/>
+          <a:lstStyle/>
           <a:p>
             <a:pPr algn="ctr">
               <a:lnSpc>
@@ -2269,7 +2502,7 @@
             <a:r>
               <a:rPr lang="en-US" sz="4400">
                 <a:solidFill>
-                  <a:srgbClr val="ffffff"/>
+                  <a:srgbClr val="FFFFFF"/>
                 </a:solidFill>
                 <a:latin typeface="Calibri"/>
               </a:rPr>
@@ -2281,7 +2514,7 @@
       </p:sp>
       <p:sp>
         <p:nvSpPr>
-          <p:cNvPr id="1" name="PlaceHolder 2"/>
+          <p:cNvPr id="6" name="PlaceHolder 2"/>
           <p:cNvSpPr>
             <a:spLocks noGrp="1"/>
           </p:cNvSpPr>
@@ -2292,14 +2525,15 @@
         <p:spPr>
           <a:xfrm>
             <a:off x="0" y="0"/>
-            <a:ext cx="-11796840" cy="-11796840"/>
-          </a:xfrm>
-          <a:prstGeom prst="rect">
-            <a:avLst/>
-          </a:prstGeom>
-        </p:spPr>
-        <p:txBody>
-          <a:bodyPr bIns="45000" lIns="90000" rIns="90000" tIns="45000"/>
+            <a:ext cx="0" cy="0"/>
+          </a:xfrm>
+          <a:prstGeom prst="rect">
+            <a:avLst/>
+          </a:prstGeom>
+        </p:spPr>
+        <p:txBody>
+          <a:bodyPr lIns="90000" tIns="45000" rIns="90000" bIns="45000"/>
+          <a:lstStyle/>
           <a:p>
             <a:pPr>
               <a:lnSpc>
@@ -2309,7 +2543,7 @@
             <a:r>
               <a:rPr lang="en-US">
                 <a:solidFill>
-                  <a:srgbClr val="ffffff"/>
+                  <a:srgbClr val="FFFFFF"/>
                 </a:solidFill>
                 <a:latin typeface="Calibri"/>
               </a:rPr>
@@ -2332,14 +2566,15 @@
         <p:spPr>
           <a:xfrm>
             <a:off x="0" y="0"/>
-            <a:ext cx="-11796840" cy="-11796840"/>
-          </a:xfrm>
-          <a:prstGeom prst="rect">
-            <a:avLst/>
-          </a:prstGeom>
-        </p:spPr>
-        <p:txBody>
-          <a:bodyPr bIns="45000" lIns="90000" rIns="90000" tIns="45000"/>
+            <a:ext cx="0" cy="0"/>
+          </a:xfrm>
+          <a:prstGeom prst="rect">
+            <a:avLst/>
+          </a:prstGeom>
+        </p:spPr>
+        <p:txBody>
+          <a:bodyPr lIns="90000" tIns="45000" rIns="90000" bIns="45000"/>
+          <a:lstStyle/>
           <a:p>
             <a:endParaRPr/>
           </a:p>
@@ -2358,14 +2593,15 @@
         <p:spPr>
           <a:xfrm>
             <a:off x="0" y="0"/>
-            <a:ext cx="-11796840" cy="-11796840"/>
-          </a:xfrm>
-          <a:prstGeom prst="rect">
-            <a:avLst/>
-          </a:prstGeom>
-        </p:spPr>
-        <p:txBody>
-          <a:bodyPr bIns="45000" lIns="90000" rIns="90000" tIns="45000"/>
+            <a:ext cx="0" cy="0"/>
+          </a:xfrm>
+          <a:prstGeom prst="rect">
+            <a:avLst/>
+          </a:prstGeom>
+        </p:spPr>
+        <p:txBody>
+          <a:bodyPr lIns="90000" tIns="45000" rIns="90000" bIns="45000"/>
+          <a:lstStyle/>
           <a:p>
             <a:pPr>
               <a:lnSpc>
@@ -2375,11 +2611,11 @@
             <a:fld id="{11C13121-E131-4121-B1F1-015161B1A1D1}" type="slidenum">
               <a:rPr lang="en-US">
                 <a:solidFill>
-                  <a:srgbClr val="ffffff"/>
+                  <a:srgbClr val="FFFFFF"/>
                 </a:solidFill>
                 <a:latin typeface="Calibri"/>
               </a:rPr>
-              <a:t>&lt;number&gt;</a:t>
+              <a:t>‹#›</a:t>
             </a:fld>
             <a:endParaRPr/>
           </a:p>
@@ -2405,7 +2641,8 @@
           </a:prstGeom>
         </p:spPr>
         <p:txBody>
-          <a:bodyPr bIns="0" lIns="0" rIns="0" tIns="0" wrap="none"/>
+          <a:bodyPr wrap="none" lIns="0" tIns="0" rIns="0" bIns="0"/>
+          <a:lstStyle/>
           <a:p>
             <a:pPr>
               <a:buSzPct val="45000"/>
@@ -2494,32 +2731,38 @@
       </p:sp>
     </p:spTree>
   </p:cSld>
-  <p:clrMap accent1="accent1" accent2="accent2" accent3="accent3" accent4="accent4" accent5="accent5" accent6="accent6" bg1="lt1" bg2="lt2" folHlink="folHlink" hlink="hlink" tx1="dk1" tx2="dk2"/>
+  <p:clrMap bg1="lt1" tx1="dk1" bg2="lt2" tx2="dk2" accent1="accent1" accent2="accent2" accent3="accent3" accent4="accent4" accent5="accent5" accent6="accent6" hlink="hlink" folHlink="folHlink"/>
   <p:sldLayoutIdLst>
-    <p:sldLayoutId id="2147483649" r:id="rId2"/>
-    <p:sldLayoutId id="2147483650" r:id="rId3"/>
-    <p:sldLayoutId id="2147483651" r:id="rId4"/>
-    <p:sldLayoutId id="2147483652" r:id="rId5"/>
-    <p:sldLayoutId id="2147483653" r:id="rId6"/>
-    <p:sldLayoutId id="2147483654" r:id="rId7"/>
-    <p:sldLayoutId id="2147483655" r:id="rId8"/>
-    <p:sldLayoutId id="2147483656" r:id="rId9"/>
-    <p:sldLayoutId id="2147483657" r:id="rId10"/>
-    <p:sldLayoutId id="2147483658" r:id="rId11"/>
-    <p:sldLayoutId id="2147483659" r:id="rId12"/>
-    <p:sldLayoutId id="2147483660" r:id="rId13"/>
+    <p:sldLayoutId id="2147483649" r:id="rId1"/>
+    <p:sldLayoutId id="2147483650" r:id="rId2"/>
+    <p:sldLayoutId id="2147483651" r:id="rId3"/>
+    <p:sldLayoutId id="2147483652" r:id="rId4"/>
+    <p:sldLayoutId id="2147483653" r:id="rId5"/>
+    <p:sldLayoutId id="2147483654" r:id="rId6"/>
+    <p:sldLayoutId id="2147483655" r:id="rId7"/>
+    <p:sldLayoutId id="2147483656" r:id="rId8"/>
+    <p:sldLayoutId id="2147483657" r:id="rId9"/>
+    <p:sldLayoutId id="2147483658" r:id="rId10"/>
+    <p:sldLayoutId id="2147483659" r:id="rId11"/>
+    <p:sldLayoutId id="2147483660" r:id="rId12"/>
   </p:sldLayoutIdLst>
+  <p:txStyles>
+    <p:titleStyle/>
+    <p:bodyStyle/>
+    <p:otherStyle/>
+  </p:txStyles>
 </p:sldMaster>
 </file>
 
 <file path=ppt/slideMasters/slideMaster2.xml><?xml version="1.0" encoding="utf-8"?>
-<p:sldMaster xmlns:a="http://schemas.openxmlformats.org/drawingml/2006/main" xmlns:p="http://schemas.openxmlformats.org/presentationml/2006/main" xmlns:r="http://schemas.openxmlformats.org/officeDocument/2006/relationships">
+<p:sldMaster xmlns:a="http://schemas.openxmlformats.org/drawingml/2006/main" xmlns:r="http://schemas.openxmlformats.org/officeDocument/2006/relationships" xmlns:p="http://schemas.openxmlformats.org/presentationml/2006/main">
   <p:cSld>
     <p:bg>
       <p:bgPr>
         <a:solidFill>
           <a:srgbClr val="000000"/>
         </a:solidFill>
+        <a:effectLst/>
       </p:bgPr>
     </p:bg>
     <p:spTree>
@@ -2549,14 +2792,15 @@
         <p:spPr>
           <a:xfrm>
             <a:off x="0" y="0"/>
-            <a:ext cx="-11796840" cy="-11796840"/>
-          </a:xfrm>
-          <a:prstGeom prst="rect">
-            <a:avLst/>
-          </a:prstGeom>
-        </p:spPr>
-        <p:txBody>
-          <a:bodyPr bIns="45000" lIns="90000" rIns="90000" tIns="45000"/>
+            <a:ext cx="0" cy="0"/>
+          </a:xfrm>
+          <a:prstGeom prst="rect">
+            <a:avLst/>
+          </a:prstGeom>
+        </p:spPr>
+        <p:txBody>
+          <a:bodyPr lIns="90000" tIns="45000" rIns="90000" bIns="45000"/>
+          <a:lstStyle/>
           <a:p>
             <a:pPr>
               <a:lnSpc>
@@ -2566,7 +2810,7 @@
             <a:r>
               <a:rPr lang="en-US">
                 <a:solidFill>
-                  <a:srgbClr val="ffffff"/>
+                  <a:srgbClr val="FFFFFF"/>
                 </a:solidFill>
                 <a:latin typeface="Calibri"/>
               </a:rPr>
@@ -2589,14 +2833,15 @@
         <p:spPr>
           <a:xfrm>
             <a:off x="0" y="0"/>
-            <a:ext cx="-11796840" cy="-11796840"/>
-          </a:xfrm>
-          <a:prstGeom prst="rect">
-            <a:avLst/>
-          </a:prstGeom>
-        </p:spPr>
-        <p:txBody>
-          <a:bodyPr bIns="45000" lIns="90000" rIns="90000" tIns="45000"/>
+            <a:ext cx="0" cy="0"/>
+          </a:xfrm>
+          <a:prstGeom prst="rect">
+            <a:avLst/>
+          </a:prstGeom>
+        </p:spPr>
+        <p:txBody>
+          <a:bodyPr lIns="90000" tIns="45000" rIns="90000" bIns="45000"/>
+          <a:lstStyle/>
           <a:p>
             <a:endParaRPr/>
           </a:p>
@@ -2615,14 +2860,15 @@
         <p:spPr>
           <a:xfrm>
             <a:off x="0" y="0"/>
-            <a:ext cx="-11796840" cy="-11796840"/>
-          </a:xfrm>
-          <a:prstGeom prst="rect">
-            <a:avLst/>
-          </a:prstGeom>
-        </p:spPr>
-        <p:txBody>
-          <a:bodyPr bIns="45000" lIns="90000" rIns="90000" tIns="45000"/>
+            <a:ext cx="0" cy="0"/>
+          </a:xfrm>
+          <a:prstGeom prst="rect">
+            <a:avLst/>
+          </a:prstGeom>
+        </p:spPr>
+        <p:txBody>
+          <a:bodyPr lIns="90000" tIns="45000" rIns="90000" bIns="45000"/>
+          <a:lstStyle/>
           <a:p>
             <a:pPr>
               <a:lnSpc>
@@ -2632,11 +2878,11 @@
             <a:fld id="{2111E1D1-E191-4121-A131-E17181C181D1}" type="slidenum">
               <a:rPr lang="en-US">
                 <a:solidFill>
-                  <a:srgbClr val="ffffff"/>
+                  <a:srgbClr val="FFFFFF"/>
                 </a:solidFill>
                 <a:latin typeface="Calibri"/>
               </a:rPr>
-              <a:t>&lt;number&gt;</a:t>
+              <a:t>‹#›</a:t>
             </a:fld>
             <a:endParaRPr/>
           </a:p>
@@ -2662,7 +2908,8 @@
           </a:prstGeom>
         </p:spPr>
         <p:txBody>
-          <a:bodyPr anchor="ctr" bIns="0" lIns="0" rIns="0" tIns="0" wrap="none"/>
+          <a:bodyPr wrap="none" lIns="0" tIns="0" rIns="0" bIns="0" anchor="ctr"/>
+          <a:lstStyle/>
           <a:p>
             <a:r>
               <a:rPr lang="en-US"/>
@@ -2692,7 +2939,8 @@
           </a:prstGeom>
         </p:spPr>
         <p:txBody>
-          <a:bodyPr bIns="0" lIns="0" rIns="0" tIns="0" wrap="none"/>
+          <a:bodyPr wrap="none" lIns="0" tIns="0" rIns="0" bIns="0"/>
+          <a:lstStyle/>
           <a:p>
             <a:pPr>
               <a:buSzPct val="45000"/>
@@ -2781,26 +3029,31 @@
       </p:sp>
     </p:spTree>
   </p:cSld>
-  <p:clrMap accent1="accent1" accent2="accent2" accent3="accent3" accent4="accent4" accent5="accent5" accent6="accent6" bg1="lt1" bg2="lt2" folHlink="folHlink" hlink="hlink" tx1="dk1" tx2="dk2"/>
+  <p:clrMap bg1="lt1" tx1="dk1" bg2="lt2" tx2="dk2" accent1="accent1" accent2="accent2" accent3="accent3" accent4="accent4" accent5="accent5" accent6="accent6" hlink="hlink" folHlink="folHlink"/>
   <p:sldLayoutIdLst>
-    <p:sldLayoutId id="2147483662" r:id="rId2"/>
-    <p:sldLayoutId id="2147483663" r:id="rId3"/>
-    <p:sldLayoutId id="2147483664" r:id="rId4"/>
-    <p:sldLayoutId id="2147483665" r:id="rId5"/>
-    <p:sldLayoutId id="2147483666" r:id="rId6"/>
-    <p:sldLayoutId id="2147483667" r:id="rId7"/>
-    <p:sldLayoutId id="2147483668" r:id="rId8"/>
-    <p:sldLayoutId id="2147483669" r:id="rId9"/>
-    <p:sldLayoutId id="2147483670" r:id="rId10"/>
-    <p:sldLayoutId id="2147483671" r:id="rId11"/>
-    <p:sldLayoutId id="2147483672" r:id="rId12"/>
-    <p:sldLayoutId id="2147483673" r:id="rId13"/>
+    <p:sldLayoutId id="2147483662" r:id="rId1"/>
+    <p:sldLayoutId id="2147483663" r:id="rId2"/>
+    <p:sldLayoutId id="2147483664" r:id="rId3"/>
+    <p:sldLayoutId id="2147483665" r:id="rId4"/>
+    <p:sldLayoutId id="2147483666" r:id="rId5"/>
+    <p:sldLayoutId id="2147483667" r:id="rId6"/>
+    <p:sldLayoutId id="2147483668" r:id="rId7"/>
+    <p:sldLayoutId id="2147483669" r:id="rId8"/>
+    <p:sldLayoutId id="2147483670" r:id="rId9"/>
+    <p:sldLayoutId id="2147483671" r:id="rId10"/>
+    <p:sldLayoutId id="2147483672" r:id="rId11"/>
+    <p:sldLayoutId id="2147483673" r:id="rId12"/>
   </p:sldLayoutIdLst>
+  <p:txStyles>
+    <p:titleStyle/>
+    <p:bodyStyle/>
+    <p:otherStyle/>
+  </p:txStyles>
 </p:sldMaster>
 </file>
 
 <file path=ppt/slides/slide1.xml><?xml version="1.0" encoding="utf-8"?>
-<p:sld xmlns:a="http://schemas.openxmlformats.org/drawingml/2006/main" xmlns:p="http://schemas.openxmlformats.org/presentationml/2006/main" xmlns:r="http://schemas.openxmlformats.org/officeDocument/2006/relationships">
+<p:sld xmlns:a="http://schemas.openxmlformats.org/drawingml/2006/main" xmlns:r="http://schemas.openxmlformats.org/officeDocument/2006/relationships" xmlns:p="http://schemas.openxmlformats.org/presentationml/2006/main">
   <p:cSld>
     <p:spTree>
       <p:nvGrpSpPr>
@@ -2833,6 +3086,7 @@
         </p:spPr>
         <p:txBody>
           <a:bodyPr anchor="ctr"/>
+          <a:lstStyle/>
           <a:p>
             <a:pPr algn="ctr">
               <a:lnSpc>
@@ -2840,15 +3094,15 @@
               </a:lnSpc>
             </a:pPr>
             <a:r>
-              <a:rPr lang="en-US" sz="9600">
+              <a:rPr lang="en-US" sz="9600" dirty="0" err="1">
                 <a:solidFill>
-                  <a:srgbClr val="4dc7e9"/>
+                  <a:srgbClr val="4DC7E9"/>
                 </a:solidFill>
                 <a:latin typeface="Heiti TC Light"/>
               </a:rPr>
               <a:t>MyoMusic</a:t>
             </a:r>
-            <a:endParaRPr/>
+            <a:endParaRPr dirty="0"/>
           </a:p>
         </p:txBody>
       </p:sp>
@@ -2868,7 +3122,8 @@
           </a:prstGeom>
         </p:spPr>
         <p:txBody>
-          <a:bodyPr bIns="45000" lIns="90000" rIns="90000" tIns="45000"/>
+          <a:bodyPr lIns="90000" tIns="45000" rIns="90000" bIns="45000"/>
+          <a:lstStyle/>
           <a:p>
             <a:pPr>
               <a:lnSpc>
@@ -2876,15 +3131,29 @@
               </a:lnSpc>
             </a:pPr>
             <a:r>
-              <a:rPr b="1" lang="en-US">
+              <a:rPr lang="en-US" b="1" dirty="0">
                 <a:solidFill>
-                  <a:srgbClr val="ffffff"/>
+                  <a:srgbClr val="FFFFFF"/>
                 </a:solidFill>
                 <a:latin typeface="Heiti TC Light"/>
+                <a:cs typeface="Heiti TC Light"/>
               </a:rPr>
-              <a:t>Jeremy Schembri</a:t>
+              <a:t>Jeremy </a:t>
             </a:r>
-            <a:endParaRPr/>
+            <a:r>
+              <a:rPr lang="en-US" b="1" dirty="0" err="1">
+                <a:solidFill>
+                  <a:srgbClr val="FFFFFF"/>
+                </a:solidFill>
+                <a:latin typeface="Heiti TC Light"/>
+                <a:cs typeface="Heiti TC Light"/>
+              </a:rPr>
+              <a:t>Schembri</a:t>
+            </a:r>
+            <a:endParaRPr dirty="0">
+              <a:latin typeface="Heiti TC Light"/>
+              <a:cs typeface="Heiti TC Light"/>
+            </a:endParaRPr>
           </a:p>
           <a:p>
             <a:pPr>
@@ -2893,15 +3162,29 @@
               </a:lnSpc>
             </a:pPr>
             <a:r>
-              <a:rPr b="1" lang="en-US">
+              <a:rPr lang="en-US" b="1" dirty="0" err="1">
                 <a:solidFill>
-                  <a:srgbClr val="ffffff"/>
+                  <a:srgbClr val="FFFFFF"/>
                 </a:solidFill>
                 <a:latin typeface="Heiti TC Light"/>
+                <a:cs typeface="Heiti TC Light"/>
               </a:rPr>
-              <a:t>Alexandre Gagnon</a:t>
+              <a:t>Alexandre</a:t>
             </a:r>
-            <a:endParaRPr/>
+            <a:r>
+              <a:rPr lang="en-US" b="1" dirty="0">
+                <a:solidFill>
+                  <a:srgbClr val="FFFFFF"/>
+                </a:solidFill>
+                <a:latin typeface="Heiti TC Light"/>
+                <a:cs typeface="Heiti TC Light"/>
+              </a:rPr>
+              <a:t> Gagnon</a:t>
+            </a:r>
+            <a:endParaRPr dirty="0">
+              <a:latin typeface="Heiti TC Light"/>
+              <a:cs typeface="Heiti TC Light"/>
+            </a:endParaRPr>
           </a:p>
           <a:p>
             <a:pPr>
@@ -2910,15 +3193,29 @@
               </a:lnSpc>
             </a:pPr>
             <a:r>
-              <a:rPr b="1" lang="en-US">
+              <a:rPr lang="en-US" b="1" dirty="0">
                 <a:solidFill>
-                  <a:srgbClr val="ffffff"/>
+                  <a:srgbClr val="FFFFFF"/>
                 </a:solidFill>
                 <a:latin typeface="Heiti TC Light"/>
+                <a:cs typeface="Heiti TC Light"/>
               </a:rPr>
-              <a:t>Imran Jameel</a:t>
+              <a:t>Imran </a:t>
             </a:r>
-            <a:endParaRPr/>
+            <a:r>
+              <a:rPr lang="en-US" b="1" dirty="0" err="1">
+                <a:solidFill>
+                  <a:srgbClr val="FFFFFF"/>
+                </a:solidFill>
+                <a:latin typeface="Heiti TC Light"/>
+                <a:cs typeface="Heiti TC Light"/>
+              </a:rPr>
+              <a:t>Jameel</a:t>
+            </a:r>
+            <a:endParaRPr dirty="0">
+              <a:latin typeface="Heiti TC Light"/>
+              <a:cs typeface="Heiti TC Light"/>
+            </a:endParaRPr>
           </a:p>
           <a:p>
             <a:pPr>
@@ -2927,15 +3224,19 @@
               </a:lnSpc>
             </a:pPr>
             <a:r>
-              <a:rPr b="1" lang="en-US">
+              <a:rPr lang="en-US" b="1" dirty="0">
                 <a:solidFill>
-                  <a:srgbClr val="ffffff"/>
+                  <a:srgbClr val="FFFFFF"/>
                 </a:solidFill>
                 <a:latin typeface="Heiti TC Light"/>
+                <a:cs typeface="Heiti TC Light"/>
               </a:rPr>
               <a:t>Brian Zhu</a:t>
             </a:r>
-            <a:endParaRPr/>
+            <a:endParaRPr dirty="0">
+              <a:latin typeface="Heiti TC Light"/>
+              <a:cs typeface="Heiti TC Light"/>
+            </a:endParaRPr>
           </a:p>
           <a:p>
             <a:pPr>
@@ -2944,15 +3245,29 @@
               </a:lnSpc>
             </a:pPr>
             <a:r>
-              <a:rPr b="1" lang="en-US">
+              <a:rPr lang="en-US" b="1" dirty="0">
                 <a:solidFill>
-                  <a:srgbClr val="ffffff"/>
+                  <a:srgbClr val="FFFFFF"/>
                 </a:solidFill>
                 <a:latin typeface="Heiti TC Light"/>
+                <a:cs typeface="Heiti TC Light"/>
               </a:rPr>
-              <a:t>Victor Dyotte</a:t>
+              <a:t>Victor </a:t>
             </a:r>
-            <a:endParaRPr/>
+            <a:r>
+              <a:rPr lang="en-US" b="1" dirty="0" err="1">
+                <a:solidFill>
+                  <a:srgbClr val="FFFFFF"/>
+                </a:solidFill>
+                <a:latin typeface="Heiti TC Light"/>
+                <a:cs typeface="Heiti TC Light"/>
+              </a:rPr>
+              <a:t>Dyotte</a:t>
+            </a:r>
+            <a:endParaRPr dirty="0">
+              <a:latin typeface="Heiti TC Light"/>
+              <a:cs typeface="Heiti TC Light"/>
+            </a:endParaRPr>
           </a:p>
           <a:p>
             <a:pPr>
@@ -2961,15 +3276,19 @@
               </a:lnSpc>
             </a:pPr>
             <a:r>
-              <a:rPr b="1" lang="en-US">
+              <a:rPr lang="en-US" b="1" dirty="0">
                 <a:solidFill>
-                  <a:srgbClr val="ffffff"/>
+                  <a:srgbClr val="FFFFFF"/>
                 </a:solidFill>
                 <a:latin typeface="Heiti TC Light"/>
+                <a:cs typeface="Heiti TC Light"/>
               </a:rPr>
               <a:t>Lucie Bélanger</a:t>
             </a:r>
-            <a:endParaRPr/>
+            <a:endParaRPr dirty="0">
+              <a:latin typeface="Heiti TC Light"/>
+              <a:cs typeface="Heiti TC Light"/>
+            </a:endParaRPr>
           </a:p>
         </p:txBody>
       </p:sp>
@@ -2989,10 +3308,11 @@
           </a:prstGeom>
         </p:spPr>
         <p:txBody>
-          <a:bodyPr bIns="45000" lIns="90000" rIns="90000" tIns="45000" wrap="none"/>
+          <a:bodyPr wrap="none" lIns="90000" tIns="45000" rIns="90000" bIns="45000"/>
+          <a:lstStyle/>
           <a:p>
             <a:r>
-              <a:rPr i="1" lang="en-US"/>
+              <a:rPr lang="en-US" i="1"/>
               <a:t>Wearable Sound</a:t>
             </a:r>
             <a:endParaRPr/>
@@ -3001,24 +3321,31 @@
       </p:sp>
     </p:spTree>
   </p:cSld>
+  <p:clrMapOvr>
+    <a:masterClrMapping/>
+  </p:clrMapOvr>
   <p:timing>
     <p:tnLst>
       <p:par>
-        <p:cTn dur="indefinite" id="1" nodeType="tmRoot" restart="never">
+        <p:cTn xmlns:p14="http://schemas.microsoft.com/office/powerpoint/2010/main" id="1" dur="indefinite" restart="never" nodeType="tmRoot">
           <p:childTnLst>
             <p:seq>
               <p:cTn id="2" nodeType="mainSeq">
-                <p:childTnLst/>
+                <p:childTnLst>
+                  <p:par>
+                    <p:cTn id="3"/>
+                  </p:par>
+                </p:childTnLst>
               </p:cTn>
               <p:prevCondLst>
-                <p:cond delay="0" evt="onPrev">
+                <p:cond evt="onPrev" delay="0">
                   <p:tgtEl>
                     <p:sldTgt/>
                   </p:tgtEl>
                 </p:cond>
               </p:prevCondLst>
               <p:nextCondLst>
-                <p:cond delay="0" evt="onNext">
+                <p:cond evt="onNext" delay="0">
                   <p:tgtEl>
                     <p:sldTgt/>
                   </p:tgtEl>
@@ -3034,7 +3361,7 @@
 </file>
 
 <file path=ppt/slides/slide2.xml><?xml version="1.0" encoding="utf-8"?>
-<p:sld xmlns:a="http://schemas.openxmlformats.org/drawingml/2006/main" xmlns:p="http://schemas.openxmlformats.org/presentationml/2006/main" xmlns:r="http://schemas.openxmlformats.org/officeDocument/2006/relationships">
+<p:sld xmlns:a="http://schemas.openxmlformats.org/drawingml/2006/main" xmlns:r="http://schemas.openxmlformats.org/officeDocument/2006/relationships" xmlns:p="http://schemas.openxmlformats.org/presentationml/2006/main">
   <p:cSld>
     <p:spTree>
       <p:nvGrpSpPr>
@@ -3052,6 +3379,50 @@
       </p:grpSpPr>
       <p:sp>
         <p:nvSpPr>
+          <p:cNvPr id="2" name="Rectangle 1"/>
+          <p:cNvSpPr/>
+          <p:nvPr/>
+        </p:nvSpPr>
+        <p:spPr>
+          <a:xfrm>
+            <a:off x="0" y="-2434"/>
+            <a:ext cx="9144000" cy="6860433"/>
+          </a:xfrm>
+          <a:prstGeom prst="rect">
+            <a:avLst/>
+          </a:prstGeom>
+          <a:solidFill>
+            <a:schemeClr val="bg1"/>
+          </a:solidFill>
+          <a:ln>
+            <a:noFill/>
+          </a:ln>
+        </p:spPr>
+        <p:style>
+          <a:lnRef idx="1">
+            <a:schemeClr val="accent1"/>
+          </a:lnRef>
+          <a:fillRef idx="3">
+            <a:schemeClr val="accent1"/>
+          </a:fillRef>
+          <a:effectRef idx="2">
+            <a:schemeClr val="accent1"/>
+          </a:effectRef>
+          <a:fontRef idx="minor">
+            <a:schemeClr val="lt1"/>
+          </a:fontRef>
+        </p:style>
+        <p:txBody>
+          <a:bodyPr rtlCol="0" anchor="ctr"/>
+          <a:lstStyle/>
+          <a:p>
+            <a:pPr algn="ctr"/>
+            <a:endParaRPr lang="fr-CA"/>
+          </a:p>
+        </p:txBody>
+      </p:sp>
+      <p:sp>
+        <p:nvSpPr>
           <p:cNvPr id="77" name="CustomShape 1"/>
           <p:cNvSpPr/>
           <p:nvPr/>
@@ -3068,12 +3439,12 @@
       </p:sp>
       <p:pic>
         <p:nvPicPr>
-          <p:cNvPr descr="" id="78" name=""/>
+          <p:cNvPr id="78" name="Picture 77"/>
           <p:cNvPicPr/>
           <p:nvPr/>
         </p:nvPicPr>
         <p:blipFill>
-          <a:blip r:embed="rId1"/>
+          <a:blip r:embed="rId2"/>
           <a:stretch>
             <a:fillRect/>
           </a:stretch>
@@ -3090,24 +3461,31 @@
       </p:pic>
     </p:spTree>
   </p:cSld>
+  <p:clrMapOvr>
+    <a:masterClrMapping/>
+  </p:clrMapOvr>
   <p:timing>
     <p:tnLst>
       <p:par>
-        <p:cTn dur="indefinite" id="3" nodeType="tmRoot" restart="never">
+        <p:cTn xmlns:p14="http://schemas.microsoft.com/office/powerpoint/2010/main" id="1" dur="indefinite" restart="never" nodeType="tmRoot">
           <p:childTnLst>
             <p:seq>
-              <p:cTn id="4" nodeType="mainSeq">
-                <p:childTnLst/>
+              <p:cTn id="2" nodeType="mainSeq">
+                <p:childTnLst>
+                  <p:par>
+                    <p:cTn id="3"/>
+                  </p:par>
+                </p:childTnLst>
               </p:cTn>
               <p:prevCondLst>
-                <p:cond delay="0" evt="onPrev">
+                <p:cond evt="onPrev" delay="0">
                   <p:tgtEl>
                     <p:sldTgt/>
                   </p:tgtEl>
                 </p:cond>
               </p:prevCondLst>
               <p:nextCondLst>
-                <p:cond delay="0" evt="onNext">
+                <p:cond evt="onNext" delay="0">
                   <p:tgtEl>
                     <p:sldTgt/>
                   </p:tgtEl>
@@ -3123,7 +3501,7 @@
 </file>
 
 <file path=ppt/slides/slide3.xml><?xml version="1.0" encoding="utf-8"?>
-<p:sld xmlns:a="http://schemas.openxmlformats.org/drawingml/2006/main" xmlns:p="http://schemas.openxmlformats.org/presentationml/2006/main" xmlns:r="http://schemas.openxmlformats.org/officeDocument/2006/relationships">
+<p:sld xmlns:a="http://schemas.openxmlformats.org/drawingml/2006/main" xmlns:r="http://schemas.openxmlformats.org/officeDocument/2006/relationships" xmlns:p="http://schemas.openxmlformats.org/presentationml/2006/main">
   <p:cSld>
     <p:spTree>
       <p:nvGrpSpPr>
@@ -3141,12 +3519,21 @@
       </p:grpSpPr>
       <p:pic>
         <p:nvPicPr>
-          <p:cNvPr descr="" id="79" name="Picture 6"/>
-          <p:cNvPicPr/>
+          <p:cNvPr id="7" name="Picture 6" descr="Slide6.jpg"/>
+          <p:cNvPicPr>
+            <a:picLocks noChangeAspect="1"/>
+          </p:cNvPicPr>
           <p:nvPr/>
         </p:nvPicPr>
         <p:blipFill>
-          <a:blip r:embed="rId1"/>
+          <a:blip r:embed="rId2">
+            <a:alphaModFix amt="35000"/>
+            <a:extLst>
+              <a:ext uri="{28A0092B-C50C-407E-A947-70E740481C1C}">
+                <a14:useLocalDpi xmlns:a14="http://schemas.microsoft.com/office/drawing/2010/main" val="0"/>
+              </a:ext>
+            </a:extLst>
+          </a:blip>
           <a:stretch>
             <a:fillRect/>
           </a:stretch>
@@ -3154,7 +3541,7 @@
         <p:spPr>
           <a:xfrm>
             <a:off x="0" y="0"/>
-            <a:ext cx="9143640" cy="6857640"/>
+            <a:ext cx="9144000" cy="6858000"/>
           </a:xfrm>
           <a:prstGeom prst="rect">
             <a:avLst/>
@@ -3163,154 +3550,236 @@
       </p:pic>
       <p:sp>
         <p:nvSpPr>
-          <p:cNvPr id="80" name="CustomShape 1"/>
-          <p:cNvSpPr/>
+          <p:cNvPr id="6" name="Title 1"/>
+          <p:cNvSpPr txBox="1">
+            <a:spLocks/>
+          </p:cNvSpPr>
           <p:nvPr/>
         </p:nvSpPr>
         <p:spPr>
           <a:xfrm>
-            <a:off x="685800" y="1650600"/>
-            <a:ext cx="7772040" cy="4754880"/>
-          </a:xfrm>
-          <a:prstGeom prst="rect">
-            <a:avLst/>
-          </a:prstGeom>
-        </p:spPr>
-        <p:txBody>
-          <a:bodyPr/>
-          <a:p>
-            <a:pPr>
+            <a:off x="685800" y="1650532"/>
+            <a:ext cx="7772400" cy="4755330"/>
+          </a:xfrm>
+          <a:prstGeom prst="rect">
+            <a:avLst/>
+          </a:prstGeom>
+          <a:effectLst>
+            <a:glow rad="139700">
+              <a:schemeClr val="accent5">
+                <a:satMod val="175000"/>
+                <a:alpha val="40000"/>
+              </a:schemeClr>
+            </a:glow>
+          </a:effectLst>
+        </p:spPr>
+        <p:txBody>
+          <a:bodyPr vert="horz" lIns="91440" tIns="45720" rIns="91440" bIns="45720" rtlCol="0" anchor="t">
+            <a:noAutofit/>
+          </a:bodyPr>
+          <a:lstStyle>
+            <a:lvl1pPr algn="ctr" defTabSz="914400" rtl="0" eaLnBrk="1" latinLnBrk="0" hangingPunct="1">
+              <a:spcBef>
+                <a:spcPct val="0"/>
+              </a:spcBef>
+              <a:buNone/>
+              <a:defRPr sz="4400" kern="1200">
+                <a:solidFill>
+                  <a:schemeClr val="tx1"/>
+                </a:solidFill>
+                <a:latin typeface="+mj-lt"/>
+                <a:ea typeface="+mj-ea"/>
+                <a:cs typeface="+mj-cs"/>
+              </a:defRPr>
+            </a:lvl1pPr>
+          </a:lstStyle>
+          <a:p>
+            <a:pPr algn="l">
               <a:lnSpc>
                 <a:spcPct val="200000"/>
               </a:lnSpc>
             </a:pPr>
             <a:r>
-              <a:rPr lang="en-US" sz="2800">
+              <a:rPr lang="fr-CA" sz="2800" dirty="0" smtClean="0">
                 <a:solidFill>
-                  <a:srgbClr val="ffffff"/>
+                  <a:schemeClr val="bg1"/>
                 </a:solidFill>
                 <a:latin typeface="Heiti TC Light"/>
+                <a:cs typeface="Heiti TC Light"/>
               </a:rPr>
-              <a:t>Musical curiosity</a:t>
+              <a:t>Musical </a:t>
             </a:r>
-            <a:endParaRPr/>
-          </a:p>
-          <a:p>
-            <a:pPr>
+            <a:r>
+              <a:rPr lang="fr-CA" sz="2800" dirty="0" err="1" smtClean="0">
+                <a:solidFill>
+                  <a:schemeClr val="bg1"/>
+                </a:solidFill>
+                <a:latin typeface="Heiti TC Light"/>
+                <a:cs typeface="Heiti TC Light"/>
+              </a:rPr>
+              <a:t>curiosity</a:t>
+            </a:r>
+            <a:endParaRPr lang="fr-CA" sz="2800" dirty="0">
+              <a:solidFill>
+                <a:schemeClr val="bg1"/>
+              </a:solidFill>
+              <a:latin typeface="Heiti TC Light"/>
+              <a:cs typeface="Heiti TC Light"/>
+            </a:endParaRPr>
+          </a:p>
+          <a:p>
+            <a:pPr algn="l">
               <a:lnSpc>
                 <a:spcPct val="200000"/>
               </a:lnSpc>
             </a:pPr>
             <a:r>
-              <a:rPr lang="en-US" sz="2800">
+              <a:rPr lang="fr-CA" sz="2800" dirty="0">
                 <a:solidFill>
-                  <a:srgbClr val="ffffff"/>
+                  <a:schemeClr val="bg1"/>
                 </a:solidFill>
                 <a:latin typeface="Heiti TC Light"/>
+                <a:cs typeface="Heiti TC Light"/>
               </a:rPr>
-              <a:t>Live performance exploration</a:t>
+              <a:t>Live performance </a:t>
             </a:r>
-            <a:endParaRPr/>
-          </a:p>
-          <a:p>
-            <a:pPr>
+            <a:r>
+              <a:rPr lang="fr-CA" sz="2800" dirty="0" smtClean="0">
+                <a:solidFill>
+                  <a:schemeClr val="bg1"/>
+                </a:solidFill>
+                <a:latin typeface="Heiti TC Light"/>
+                <a:cs typeface="Heiti TC Light"/>
+              </a:rPr>
+              <a:t>exploration</a:t>
+            </a:r>
+          </a:p>
+          <a:p>
+            <a:pPr algn="l">
               <a:lnSpc>
                 <a:spcPct val="200000"/>
               </a:lnSpc>
             </a:pPr>
             <a:r>
-              <a:rPr lang="en-US" sz="2800">
+              <a:rPr lang="fr-CA" sz="2800" dirty="0" err="1" smtClean="0">
                 <a:solidFill>
-                  <a:srgbClr val="ffffff"/>
+                  <a:schemeClr val="bg1"/>
                 </a:solidFill>
                 <a:latin typeface="Heiti TC Light"/>
+                <a:cs typeface="Heiti TC Light"/>
               </a:rPr>
-              <a:t>Crowd engagement</a:t>
+              <a:t>Crowd</a:t>
             </a:r>
-            <a:endParaRPr/>
-          </a:p>
-          <a:p>
-            <a:pPr>
+            <a:r>
+              <a:rPr lang="fr-CA" sz="2800" dirty="0" smtClean="0">
+                <a:solidFill>
+                  <a:schemeClr val="bg1"/>
+                </a:solidFill>
+                <a:latin typeface="Heiti TC Light"/>
+                <a:cs typeface="Heiti TC Light"/>
+              </a:rPr>
+              <a:t> engagement</a:t>
+            </a:r>
+          </a:p>
+          <a:p>
+            <a:pPr algn="l">
               <a:lnSpc>
                 <a:spcPct val="200000"/>
               </a:lnSpc>
             </a:pPr>
-            <a:endParaRPr/>
-          </a:p>
-        </p:txBody>
-      </p:sp>
-      <p:sp>
-        <p:nvSpPr>
-          <p:cNvPr id="81" name="CustomShape 2"/>
-          <p:cNvSpPr/>
+            <a:endParaRPr lang="fr-CA" sz="2800" dirty="0">
+              <a:solidFill>
+                <a:schemeClr val="bg1"/>
+              </a:solidFill>
+              <a:latin typeface="Heiti TC Light"/>
+              <a:cs typeface="Heiti TC Light"/>
+            </a:endParaRPr>
+          </a:p>
+        </p:txBody>
+      </p:sp>
+      <p:sp>
+        <p:nvSpPr>
+          <p:cNvPr id="9" name="Title 1"/>
+          <p:cNvSpPr txBox="1">
+            <a:spLocks/>
+          </p:cNvSpPr>
           <p:nvPr/>
         </p:nvSpPr>
         <p:spPr>
           <a:xfrm>
-            <a:off x="814320" y="487800"/>
-            <a:ext cx="7772040" cy="849960"/>
-          </a:xfrm>
-          <a:prstGeom prst="rect">
-            <a:avLst/>
-          </a:prstGeom>
-        </p:spPr>
-        <p:txBody>
-          <a:bodyPr bIns="45000" lIns="90000" rIns="90000" tIns="45000"/>
-          <a:p>
-            <a:pPr>
-              <a:lnSpc>
-                <a:spcPct val="100000"/>
-              </a:lnSpc>
-            </a:pPr>
+            <a:off x="814237" y="487968"/>
+            <a:ext cx="7772400" cy="850485"/>
+          </a:xfrm>
+          <a:prstGeom prst="rect">
+            <a:avLst/>
+          </a:prstGeom>
+          <a:effectLst>
+            <a:glow rad="139700">
+              <a:schemeClr val="accent5">
+                <a:satMod val="175000"/>
+                <a:alpha val="40000"/>
+              </a:schemeClr>
+            </a:glow>
+          </a:effectLst>
+        </p:spPr>
+        <p:txBody>
+          <a:bodyPr>
+            <a:noAutofit/>
+          </a:bodyPr>
+          <a:lstStyle>
+            <a:lvl1pPr algn="ctr" defTabSz="914400" rtl="0" eaLnBrk="1" latinLnBrk="0" hangingPunct="1">
+              <a:spcBef>
+                <a:spcPct val="0"/>
+              </a:spcBef>
+              <a:buNone/>
+              <a:defRPr sz="4400" kern="1200">
+                <a:solidFill>
+                  <a:schemeClr val="tx1"/>
+                </a:solidFill>
+                <a:latin typeface="+mj-lt"/>
+                <a:ea typeface="+mj-ea"/>
+                <a:cs typeface="+mj-cs"/>
+              </a:defRPr>
+            </a:lvl1pPr>
+          </a:lstStyle>
+          <a:p>
             <a:r>
-              <a:rPr lang="en-US" sz="4000">
+              <a:rPr lang="fr-CA" sz="4000" dirty="0" smtClean="0">
                 <a:solidFill>
-                  <a:srgbClr val="4dc7e9"/>
+                  <a:srgbClr val="4DC7E9"/>
                 </a:solidFill>
+                <a:effectLst/>
                 <a:latin typeface="Heiti TC Light"/>
+                <a:cs typeface="Heiti TC Light"/>
               </a:rPr>
               <a:t>Motivation</a:t>
             </a:r>
-            <a:endParaRPr/>
+            <a:endParaRPr lang="fr-CA" sz="4000" dirty="0">
+              <a:solidFill>
+                <a:srgbClr val="4DC7E9"/>
+              </a:solidFill>
+              <a:effectLst/>
+              <a:latin typeface="Heiti TC Light"/>
+              <a:cs typeface="Heiti TC Light"/>
+            </a:endParaRPr>
           </a:p>
         </p:txBody>
       </p:sp>
     </p:spTree>
+    <p:extLst>
+      <p:ext uri="{BB962C8B-B14F-4D97-AF65-F5344CB8AC3E}">
+        <p14:creationId xmlns:p14="http://schemas.microsoft.com/office/powerpoint/2010/main" val="3657193529"/>
+      </p:ext>
+    </p:extLst>
   </p:cSld>
-  <p:timing>
-    <p:tnLst>
-      <p:par>
-        <p:cTn dur="indefinite" id="5" nodeType="tmRoot" restart="never">
-          <p:childTnLst>
-            <p:seq>
-              <p:cTn id="6" nodeType="mainSeq">
-                <p:childTnLst/>
-              </p:cTn>
-              <p:prevCondLst>
-                <p:cond delay="0" evt="onPrev">
-                  <p:tgtEl>
-                    <p:sldTgt/>
-                  </p:tgtEl>
-                </p:cond>
-              </p:prevCondLst>
-              <p:nextCondLst>
-                <p:cond delay="0" evt="onNext">
-                  <p:tgtEl>
-                    <p:sldTgt/>
-                  </p:tgtEl>
-                </p:cond>
-              </p:nextCondLst>
-            </p:seq>
-          </p:childTnLst>
-        </p:cTn>
-      </p:par>
-    </p:tnLst>
-  </p:timing>
+  <p:clrMapOvr>
+    <a:masterClrMapping/>
+  </p:clrMapOvr>
 </p:sld>
 </file>
 
 <file path=ppt/slides/slide4.xml><?xml version="1.0" encoding="utf-8"?>
-<p:sld xmlns:a="http://schemas.openxmlformats.org/drawingml/2006/main" xmlns:p="http://schemas.openxmlformats.org/presentationml/2006/main" xmlns:r="http://schemas.openxmlformats.org/officeDocument/2006/relationships">
+<p:sld xmlns:a="http://schemas.openxmlformats.org/drawingml/2006/main" xmlns:r="http://schemas.openxmlformats.org/officeDocument/2006/relationships" xmlns:p="http://schemas.openxmlformats.org/presentationml/2006/main">
   <p:cSld>
     <p:spTree>
       <p:nvGrpSpPr>
@@ -3341,11 +3810,11 @@
             <a:avLst/>
           </a:prstGeom>
           <a:solidFill>
-            <a:srgbClr val="ffffff"/>
+            <a:srgbClr val="FFFFFF"/>
           </a:solidFill>
           <a:ln w="9360">
             <a:solidFill>
-              <a:srgbClr val="5c99cf"/>
+              <a:srgbClr val="5C99CF"/>
             </a:solidFill>
             <a:round/>
           </a:ln>
@@ -3353,12 +3822,12 @@
       </p:sp>
       <p:pic>
         <p:nvPicPr>
-          <p:cNvPr descr="" id="83" name="Picture 2"/>
+          <p:cNvPr id="83" name="Picture 2"/>
           <p:cNvPicPr/>
           <p:nvPr/>
         </p:nvPicPr>
         <p:blipFill>
-          <a:blip r:embed="rId1"/>
+          <a:blip r:embed="rId2"/>
           <a:stretch>
             <a:fillRect/>
           </a:stretch>
@@ -3381,7 +3850,7 @@
         </p:nvSpPr>
         <p:spPr>
           <a:xfrm>
-            <a:off x="814320" y="487800"/>
+            <a:off x="814320" y="462685"/>
             <a:ext cx="7772040" cy="849960"/>
           </a:xfrm>
           <a:prstGeom prst="rect">
@@ -3389,23 +3858,24 @@
           </a:prstGeom>
         </p:spPr>
         <p:txBody>
-          <a:bodyPr bIns="45000" lIns="90000" rIns="90000" tIns="45000"/>
-          <a:p>
-            <a:pPr>
+          <a:bodyPr lIns="90000" tIns="45000" rIns="90000" bIns="45000"/>
+          <a:lstStyle/>
+          <a:p>
+            <a:pPr algn="ctr">
               <a:lnSpc>
                 <a:spcPct val="100000"/>
               </a:lnSpc>
             </a:pPr>
             <a:r>
-              <a:rPr lang="en-US" sz="4000">
+              <a:rPr lang="en-US" sz="4000" dirty="0">
                 <a:solidFill>
-                  <a:srgbClr val="4dc7e9"/>
+                  <a:srgbClr val="4DC7E9"/>
                 </a:solidFill>
                 <a:latin typeface="Heiti TC Light"/>
               </a:rPr>
               <a:t>Start with a great device</a:t>
             </a:r>
-            <a:endParaRPr/>
+            <a:endParaRPr dirty="0"/>
           </a:p>
         </p:txBody>
       </p:sp>
@@ -3417,7 +3887,7 @@
         </p:nvSpPr>
         <p:spPr>
           <a:xfrm>
-            <a:off x="3291840" y="6858000"/>
+            <a:off x="3612566" y="6319900"/>
             <a:ext cx="2032560" cy="346320"/>
           </a:xfrm>
           <a:prstGeom prst="rect">
@@ -3425,40 +3895,77 @@
           </a:prstGeom>
         </p:spPr>
         <p:txBody>
-          <a:bodyPr bIns="45000" lIns="90000" rIns="90000" tIns="45000" wrap="none"/>
-          <a:p>
+          <a:bodyPr wrap="none" lIns="90000" tIns="45000" rIns="90000" bIns="45000"/>
+          <a:lstStyle/>
+          <a:p>
+            <a:pPr algn="ctr"/>
             <a:r>
-              <a:rPr lang="en-US">
+              <a:rPr lang="en-US" dirty="0" err="1">
                 <a:solidFill>
-                  <a:srgbClr val="000000"/>
+                  <a:srgbClr val="4DC7E9"/>
                 </a:solidFill>
+                <a:latin typeface="Heiti TC Medium"/>
+                <a:cs typeface="Heiti TC Medium"/>
               </a:rPr>
-              <a:t>Thalmic Labs Myo</a:t>
+              <a:t>Thalmic</a:t>
             </a:r>
-            <a:endParaRPr/>
+            <a:r>
+              <a:rPr lang="en-US" dirty="0">
+                <a:solidFill>
+                  <a:srgbClr val="4DC7E9"/>
+                </a:solidFill>
+                <a:latin typeface="Heiti TC Medium"/>
+                <a:cs typeface="Heiti TC Medium"/>
+              </a:rPr>
+              <a:t> Labs </a:t>
+            </a:r>
+            <a:r>
+              <a:rPr lang="en-US" dirty="0" err="1">
+                <a:solidFill>
+                  <a:srgbClr val="4DC7E9"/>
+                </a:solidFill>
+                <a:latin typeface="Heiti TC Medium"/>
+                <a:cs typeface="Heiti TC Medium"/>
+              </a:rPr>
+              <a:t>Myo</a:t>
+            </a:r>
+            <a:endParaRPr dirty="0">
+              <a:solidFill>
+                <a:srgbClr val="4DC7E9"/>
+              </a:solidFill>
+              <a:latin typeface="Heiti TC Medium"/>
+              <a:cs typeface="Heiti TC Medium"/>
+            </a:endParaRPr>
           </a:p>
         </p:txBody>
       </p:sp>
     </p:spTree>
   </p:cSld>
+  <p:clrMapOvr>
+    <a:masterClrMapping/>
+  </p:clrMapOvr>
   <p:timing>
     <p:tnLst>
       <p:par>
-        <p:cTn dur="indefinite" id="7" nodeType="tmRoot" restart="never">
+        <p:cTn xmlns:p14="http://schemas.microsoft.com/office/powerpoint/2010/main" id="1" dur="indefinite" restart="never" nodeType="tmRoot">
           <p:childTnLst>
             <p:seq>
-              <p:cTn id="8" nodeType="mainSeq">
-                <p:childTnLst/>
+              <p:cTn id="2" nodeType="mainSeq">
+                <p:childTnLst>
+                  <p:par>
+                    <p:cTn id="3"/>
+                  </p:par>
+                </p:childTnLst>
               </p:cTn>
               <p:prevCondLst>
-                <p:cond delay="0" evt="onPrev">
+                <p:cond evt="onPrev" delay="0">
                   <p:tgtEl>
                     <p:sldTgt/>
                   </p:tgtEl>
                 </p:cond>
               </p:prevCondLst>
               <p:nextCondLst>
-                <p:cond delay="0" evt="onNext">
+                <p:cond evt="onNext" delay="0">
                   <p:tgtEl>
                     <p:sldTgt/>
                   </p:tgtEl>
@@ -3474,7 +3981,7 @@
 </file>
 
 <file path=ppt/slides/slide5.xml><?xml version="1.0" encoding="utf-8"?>
-<p:sld xmlns:a="http://schemas.openxmlformats.org/drawingml/2006/main" xmlns:p="http://schemas.openxmlformats.org/presentationml/2006/main" xmlns:r="http://schemas.openxmlformats.org/officeDocument/2006/relationships">
+<p:sld xmlns:a="http://schemas.openxmlformats.org/drawingml/2006/main" xmlns:r="http://schemas.openxmlformats.org/officeDocument/2006/relationships" xmlns:p="http://schemas.openxmlformats.org/presentationml/2006/main">
   <p:cSld>
     <p:spTree>
       <p:nvGrpSpPr>
@@ -3492,12 +3999,12 @@
       </p:grpSpPr>
       <p:pic>
         <p:nvPicPr>
-          <p:cNvPr descr="" id="86" name="Picture 2"/>
+          <p:cNvPr id="86" name="Picture 2"/>
           <p:cNvPicPr/>
           <p:nvPr/>
         </p:nvPicPr>
         <p:blipFill>
-          <a:blip r:embed="rId1"/>
+          <a:blip r:embed="rId2"/>
           <a:stretch>
             <a:fillRect/>
           </a:stretch>
@@ -3528,33 +4035,37 @@
           </a:prstGeom>
         </p:spPr>
         <p:txBody>
-          <a:bodyPr bIns="45000" lIns="90000" rIns="90000" tIns="45000"/>
-          <a:p>
-            <a:pPr>
+          <a:bodyPr lIns="90000" tIns="45000" rIns="90000" bIns="45000"/>
+          <a:lstStyle/>
+          <a:p>
+            <a:pPr algn="ctr">
               <a:lnSpc>
                 <a:spcPct val="100000"/>
               </a:lnSpc>
             </a:pPr>
             <a:r>
-              <a:rPr lang="en-US" sz="4000">
+              <a:rPr lang="en-US" sz="4000" dirty="0">
                 <a:solidFill>
-                  <a:srgbClr val="4dc7e9"/>
+                  <a:srgbClr val="4DC7E9"/>
                 </a:solidFill>
                 <a:latin typeface="Heiti TC Light"/>
               </a:rPr>
               <a:t>Figure out how to use it</a:t>
             </a:r>
-            <a:endParaRPr/>
+            <a:endParaRPr dirty="0"/>
           </a:p>
         </p:txBody>
       </p:sp>
     </p:spTree>
   </p:cSld>
+  <p:clrMapOvr>
+    <a:masterClrMapping/>
+  </p:clrMapOvr>
 </p:sld>
 </file>
 
 <file path=ppt/slides/slide6.xml><?xml version="1.0" encoding="utf-8"?>
-<p:sld xmlns:a="http://schemas.openxmlformats.org/drawingml/2006/main" xmlns:p="http://schemas.openxmlformats.org/presentationml/2006/main" xmlns:r="http://schemas.openxmlformats.org/officeDocument/2006/relationships">
+<p:sld xmlns:a="http://schemas.openxmlformats.org/drawingml/2006/main" xmlns:r="http://schemas.openxmlformats.org/officeDocument/2006/relationships" xmlns:p="http://schemas.openxmlformats.org/presentationml/2006/main">
   <p:cSld>
     <p:spTree>
       <p:nvGrpSpPr>
@@ -3572,12 +4083,12 @@
       </p:grpSpPr>
       <p:pic>
         <p:nvPicPr>
-          <p:cNvPr descr="" id="88" name=""/>
+          <p:cNvPr id="88" name="Picture 87"/>
           <p:cNvPicPr/>
           <p:nvPr/>
         </p:nvPicPr>
         <p:blipFill>
-          <a:blip r:embed="rId1"/>
+          <a:blip r:embed="rId2"/>
           <a:stretch>
             <a:fillRect/>
           </a:stretch>
@@ -3594,24 +4105,31 @@
       </p:pic>
     </p:spTree>
   </p:cSld>
+  <p:clrMapOvr>
+    <a:masterClrMapping/>
+  </p:clrMapOvr>
   <p:timing>
     <p:tnLst>
       <p:par>
-        <p:cTn dur="indefinite" id="9" nodeType="tmRoot" restart="never">
+        <p:cTn xmlns:p14="http://schemas.microsoft.com/office/powerpoint/2010/main" id="1" dur="indefinite" restart="never" nodeType="tmRoot">
           <p:childTnLst>
             <p:seq>
-              <p:cTn id="10" nodeType="mainSeq">
-                <p:childTnLst/>
+              <p:cTn id="2" nodeType="mainSeq">
+                <p:childTnLst>
+                  <p:par>
+                    <p:cTn id="3"/>
+                  </p:par>
+                </p:childTnLst>
               </p:cTn>
               <p:prevCondLst>
-                <p:cond delay="0" evt="onPrev">
+                <p:cond evt="onPrev" delay="0">
                   <p:tgtEl>
                     <p:sldTgt/>
                   </p:tgtEl>
                 </p:cond>
               </p:prevCondLst>
               <p:nextCondLst>
-                <p:cond delay="0" evt="onNext">
+                <p:cond evt="onNext" delay="0">
                   <p:tgtEl>
                     <p:sldTgt/>
                   </p:tgtEl>
@@ -3627,7 +4145,7 @@
 </file>
 
 <file path=ppt/slides/slide7.xml><?xml version="1.0" encoding="utf-8"?>
-<p:sld xmlns:a="http://schemas.openxmlformats.org/drawingml/2006/main" xmlns:p="http://schemas.openxmlformats.org/presentationml/2006/main" xmlns:r="http://schemas.openxmlformats.org/officeDocument/2006/relationships">
+<p:sld xmlns:a="http://schemas.openxmlformats.org/drawingml/2006/main" xmlns:r="http://schemas.openxmlformats.org/officeDocument/2006/relationships" xmlns:p="http://schemas.openxmlformats.org/presentationml/2006/main">
   <p:cSld>
     <p:spTree>
       <p:nvGrpSpPr>
@@ -3645,20 +4163,28 @@
       </p:grpSpPr>
       <p:pic>
         <p:nvPicPr>
-          <p:cNvPr descr="" id="89" name="Picture 2"/>
-          <p:cNvPicPr/>
+          <p:cNvPr id="3" name="Picture 2"/>
+          <p:cNvPicPr>
+            <a:picLocks noChangeAspect="1"/>
+          </p:cNvPicPr>
           <p:nvPr/>
         </p:nvPicPr>
         <p:blipFill>
-          <a:blip r:embed="rId1"/>
+          <a:blip r:embed="rId2">
+            <a:extLst>
+              <a:ext uri="{28A0092B-C50C-407E-A947-70E740481C1C}">
+                <a14:useLocalDpi xmlns:a14="http://schemas.microsoft.com/office/drawing/2010/main" val="0"/>
+              </a:ext>
+            </a:extLst>
+          </a:blip>
           <a:stretch>
             <a:fillRect/>
           </a:stretch>
         </p:blipFill>
         <p:spPr>
           <a:xfrm>
-            <a:off x="-560160" y="0"/>
-            <a:ext cx="10286640" cy="6857640"/>
+            <a:off x="-560211" y="0"/>
+            <a:ext cx="10287000" cy="6858000"/>
           </a:xfrm>
           <a:prstGeom prst="rect">
             <a:avLst/>
@@ -3667,42 +4193,111 @@
       </p:pic>
       <p:sp>
         <p:nvSpPr>
-          <p:cNvPr id="90" name="CustomShape 1"/>
-          <p:cNvSpPr/>
+          <p:cNvPr id="5" name="Title 1"/>
+          <p:cNvSpPr txBox="1">
+            <a:spLocks/>
+          </p:cNvSpPr>
           <p:nvPr/>
         </p:nvSpPr>
         <p:spPr>
           <a:xfrm>
-            <a:off x="814320" y="1635120"/>
-            <a:ext cx="7772040" cy="3587040"/>
-          </a:xfrm>
-          <a:prstGeom prst="rect">
-            <a:avLst/>
-          </a:prstGeom>
-        </p:spPr>
-        <p:txBody>
-          <a:bodyPr bIns="45000" lIns="90000" rIns="90000" tIns="45000"/>
-          <a:p>
-            <a:pPr>
-              <a:lnSpc>
-                <a:spcPct val="100000"/>
-              </a:lnSpc>
-            </a:pPr>
+            <a:off x="814237" y="1635132"/>
+            <a:ext cx="7772400" cy="3587293"/>
+          </a:xfrm>
+          <a:prstGeom prst="rect">
+            <a:avLst/>
+          </a:prstGeom>
+          <a:effectLst>
+            <a:glow rad="139700">
+              <a:schemeClr val="accent5">
+                <a:satMod val="175000"/>
+                <a:alpha val="40000"/>
+              </a:schemeClr>
+            </a:glow>
+          </a:effectLst>
+        </p:spPr>
+        <p:txBody>
+          <a:bodyPr>
+            <a:noAutofit/>
+          </a:bodyPr>
+          <a:lstStyle>
+            <a:lvl1pPr algn="ctr" defTabSz="914400" rtl="0" eaLnBrk="1" latinLnBrk="0" hangingPunct="1">
+              <a:spcBef>
+                <a:spcPct val="0"/>
+              </a:spcBef>
+              <a:buNone/>
+              <a:defRPr sz="4400" kern="1200">
+                <a:solidFill>
+                  <a:schemeClr val="tx1"/>
+                </a:solidFill>
+                <a:latin typeface="+mj-lt"/>
+                <a:ea typeface="+mj-ea"/>
+                <a:cs typeface="+mj-cs"/>
+              </a:defRPr>
+            </a:lvl1pPr>
+          </a:lstStyle>
+          <a:p>
             <a:r>
-              <a:rPr lang="en-US" sz="9600">
+              <a:rPr lang="fr-CA" sz="9600" dirty="0" err="1" smtClean="0">
                 <a:solidFill>
-                  <a:srgbClr val="ffff00"/>
+                  <a:srgbClr val="FFFF00"/>
                 </a:solidFill>
+                <a:effectLst>
+                  <a:glow rad="228600">
+                    <a:srgbClr val="4DC7E9">
+                      <a:alpha val="74000"/>
+                    </a:srgbClr>
+                  </a:glow>
+                </a:effectLst>
                 <a:latin typeface="Heiti TC Light"/>
+                <a:cs typeface="Heiti TC Light"/>
               </a:rPr>
-              <a:t>Become a rock star!</a:t>
+              <a:t>Become</a:t>
             </a:r>
-            <a:endParaRPr/>
+            <a:r>
+              <a:rPr lang="fr-CA" sz="9600" dirty="0" smtClean="0">
+                <a:solidFill>
+                  <a:srgbClr val="FFFF00"/>
+                </a:solidFill>
+                <a:effectLst>
+                  <a:glow rad="228600">
+                    <a:srgbClr val="4DC7E9">
+                      <a:alpha val="74000"/>
+                    </a:srgbClr>
+                  </a:glow>
+                </a:effectLst>
+                <a:latin typeface="Heiti TC Light"/>
+                <a:cs typeface="Heiti TC Light"/>
+              </a:rPr>
+              <a:t> a rock star!</a:t>
+            </a:r>
+            <a:endParaRPr lang="fr-CA" sz="9600" dirty="0">
+              <a:solidFill>
+                <a:srgbClr val="FFFF00"/>
+              </a:solidFill>
+              <a:effectLst>
+                <a:glow rad="228600">
+                  <a:srgbClr val="4DC7E9">
+                    <a:alpha val="74000"/>
+                  </a:srgbClr>
+                </a:glow>
+              </a:effectLst>
+              <a:latin typeface="Heiti TC Light"/>
+              <a:cs typeface="Heiti TC Light"/>
+            </a:endParaRPr>
           </a:p>
         </p:txBody>
       </p:sp>
     </p:spTree>
+    <p:extLst>
+      <p:ext uri="{BB962C8B-B14F-4D97-AF65-F5344CB8AC3E}">
+        <p14:creationId xmlns:p14="http://schemas.microsoft.com/office/powerpoint/2010/main" val="1401468323"/>
+      </p:ext>
+    </p:extLst>
   </p:cSld>
+  <p:clrMapOvr>
+    <a:masterClrMapping/>
+  </p:clrMapOvr>
 </p:sld>
 </file>
 
@@ -3926,6 +4521,8 @@
       </a:bgFillStyleLst>
     </a:fmtScheme>
   </a:themeElements>
+  <a:objectDefaults/>
+  <a:extraClrSchemeLst/>
 </a:theme>
 </file>
 
@@ -4149,5 +4746,7 @@
       </a:bgFillStyleLst>
     </a:fmtScheme>
   </a:themeElements>
+  <a:objectDefaults/>
+  <a:extraClrSchemeLst/>
 </a:theme>
 </file>
</xml_diff>